<commit_message>
removed useless images and fixed a minor alignment error
</commit_message>
<xml_diff>
--- a/2017-10-23__bielefeld__de.nbi_symposium/poster.pptx
+++ b/2017-10-23__bielefeld__de.nbi_symposium/poster.pptx
@@ -58,13 +58,7 @@
               <a:rPr b="0" lang="en-US" sz="2000" spc="-1" strike="noStrike">
                 <a:latin typeface="Arial"/>
               </a:rPr>
-              <a:t>Click to edit the </a:t>
-            </a:r>
-            <a:r>
-              <a:rPr b="0" lang="en-US" sz="2000" spc="-1" strike="noStrike">
-                <a:latin typeface="Arial"/>
-              </a:rPr>
-              <a:t>notes format</a:t>
+              <a:t>Click to edit the notes format</a:t>
             </a:r>
             <a:endParaRPr b="0" lang="en-US" sz="2000" spc="-1" strike="noStrike">
               <a:latin typeface="Arial"/>
@@ -198,7 +192,7 @@
           <a:bodyPr lIns="0" rIns="0" tIns="0" bIns="0" anchor="b"/>
           <a:p>
             <a:pPr algn="r"/>
-            <a:fld id="{151ACC65-4845-43AC-90A9-B1066BB9624E}" type="slidenum">
+            <a:fld id="{6CA38455-BE46-4038-B848-3CA845E5EE6C}" type="slidenum">
               <a:rPr b="0" lang="en-US" sz="1400" spc="-1" strike="noStrike">
                 <a:latin typeface="Times New Roman"/>
               </a:rPr>
@@ -246,7 +240,7 @@
         <p:spPr>
           <a:xfrm>
             <a:off x="679320" y="4704840"/>
-            <a:ext cx="5435640" cy="4456800"/>
+            <a:ext cx="5435280" cy="4456440"/>
           </a:xfrm>
           <a:prstGeom prst="rect">
             <a:avLst/>
@@ -272,7 +266,7 @@
         <p:spPr>
           <a:xfrm>
             <a:off x="3848400" y="9409680"/>
-            <a:ext cx="2943720" cy="493920"/>
+            <a:ext cx="2943360" cy="493560"/>
           </a:xfrm>
           <a:prstGeom prst="rect">
             <a:avLst/>
@@ -288,29 +282,6 @@
           <a:effectRef idx="0"/>
           <a:fontRef idx="minor"/>
         </p:style>
-        <p:txBody>
-          <a:bodyPr lIns="95400" rIns="95400" tIns="47880" bIns="47880" anchor="b"/>
-          <a:p>
-            <a:pPr algn="r">
-              <a:lnSpc>
-                <a:spcPct val="100000"/>
-              </a:lnSpc>
-            </a:pPr>
-            <a:fld id="{1AB49C03-820C-430D-920D-5622BFA73D95}" type="slidenum">
-              <a:rPr b="0" lang="en-US" sz="1300" spc="-1" strike="noStrike">
-                <a:solidFill>
-                  <a:srgbClr val="000000"/>
-                </a:solidFill>
-                <a:latin typeface="Arial"/>
-                <a:ea typeface="ＭＳ Ｐゴシック"/>
-              </a:rPr>
-              <a:t>&lt;number&gt;</a:t>
-            </a:fld>
-            <a:endParaRPr b="0" lang="en-US" sz="1300" spc="-1" strike="noStrike">
-              <a:latin typeface="Arial"/>
-            </a:endParaRPr>
-          </a:p>
-        </p:txBody>
       </p:sp>
     </p:spTree>
   </p:cSld>
@@ -369,7 +340,7 @@
         <p:spPr>
           <a:xfrm>
             <a:off x="342720" y="394920"/>
-            <a:ext cx="6171480" cy="1653480"/>
+            <a:ext cx="6171120" cy="1653120"/>
           </a:xfrm>
           <a:prstGeom prst="rect">
             <a:avLst/>
@@ -398,7 +369,7 @@
         <p:spPr>
           <a:xfrm>
             <a:off x="342720" y="2317680"/>
-            <a:ext cx="6171840" cy="2739960"/>
+            <a:ext cx="6171480" cy="2739960"/>
           </a:xfrm>
           <a:prstGeom prst="rect">
             <a:avLst/>
@@ -428,7 +399,7 @@
         <p:spPr>
           <a:xfrm>
             <a:off x="342720" y="5318280"/>
-            <a:ext cx="6171840" cy="2739960"/>
+            <a:ext cx="6171480" cy="2739960"/>
           </a:xfrm>
           <a:prstGeom prst="rect">
             <a:avLst/>
@@ -480,7 +451,7 @@
         <p:spPr>
           <a:xfrm>
             <a:off x="342720" y="394920"/>
-            <a:ext cx="6171480" cy="1653480"/>
+            <a:ext cx="6171120" cy="1653120"/>
           </a:xfrm>
           <a:prstGeom prst="rect">
             <a:avLst/>
@@ -509,7 +480,7 @@
         <p:spPr>
           <a:xfrm>
             <a:off x="342720" y="2317680"/>
-            <a:ext cx="3011760" cy="2739960"/>
+            <a:ext cx="3011400" cy="2739960"/>
           </a:xfrm>
           <a:prstGeom prst="rect">
             <a:avLst/>
@@ -538,8 +509,8 @@
         </p:nvSpPr>
         <p:spPr>
           <a:xfrm>
-            <a:off x="3505320" y="2317680"/>
-            <a:ext cx="3011760" cy="2739960"/>
+            <a:off x="3504960" y="2317680"/>
+            <a:ext cx="3011400" cy="2739960"/>
           </a:xfrm>
           <a:prstGeom prst="rect">
             <a:avLst/>
@@ -568,8 +539,8 @@
         </p:nvSpPr>
         <p:spPr>
           <a:xfrm>
-            <a:off x="3505320" y="5318280"/>
-            <a:ext cx="3011760" cy="2739960"/>
+            <a:off x="3504960" y="5318280"/>
+            <a:ext cx="3011400" cy="2739960"/>
           </a:xfrm>
           <a:prstGeom prst="rect">
             <a:avLst/>
@@ -599,7 +570,7 @@
         <p:spPr>
           <a:xfrm>
             <a:off x="342720" y="5318280"/>
-            <a:ext cx="3011760" cy="2739960"/>
+            <a:ext cx="3011400" cy="2739960"/>
           </a:xfrm>
           <a:prstGeom prst="rect">
             <a:avLst/>
@@ -651,7 +622,7 @@
         <p:spPr>
           <a:xfrm>
             <a:off x="342720" y="394920"/>
-            <a:ext cx="6171480" cy="1653480"/>
+            <a:ext cx="6171120" cy="1653120"/>
           </a:xfrm>
           <a:prstGeom prst="rect">
             <a:avLst/>
@@ -680,7 +651,7 @@
         <p:spPr>
           <a:xfrm>
             <a:off x="342720" y="2317680"/>
-            <a:ext cx="1987200" cy="2739960"/>
+            <a:ext cx="1986840" cy="2739960"/>
           </a:xfrm>
           <a:prstGeom prst="rect">
             <a:avLst/>
@@ -709,8 +680,8 @@
         </p:nvSpPr>
         <p:spPr>
           <a:xfrm>
-            <a:off x="2429640" y="2317680"/>
-            <a:ext cx="1987200" cy="2739960"/>
+            <a:off x="2429280" y="2317680"/>
+            <a:ext cx="1986840" cy="2739960"/>
           </a:xfrm>
           <a:prstGeom prst="rect">
             <a:avLst/>
@@ -739,8 +710,8 @@
         </p:nvSpPr>
         <p:spPr>
           <a:xfrm>
-            <a:off x="4516560" y="2317680"/>
-            <a:ext cx="1987200" cy="2739960"/>
+            <a:off x="4515840" y="2317680"/>
+            <a:ext cx="1986840" cy="2739960"/>
           </a:xfrm>
           <a:prstGeom prst="rect">
             <a:avLst/>
@@ -769,8 +740,8 @@
         </p:nvSpPr>
         <p:spPr>
           <a:xfrm>
-            <a:off x="4516560" y="5318280"/>
-            <a:ext cx="1987200" cy="2739960"/>
+            <a:off x="4515840" y="5318280"/>
+            <a:ext cx="1986840" cy="2739960"/>
           </a:xfrm>
           <a:prstGeom prst="rect">
             <a:avLst/>
@@ -799,8 +770,8 @@
         </p:nvSpPr>
         <p:spPr>
           <a:xfrm>
-            <a:off x="2429640" y="5318280"/>
-            <a:ext cx="1987200" cy="2739960"/>
+            <a:off x="2429280" y="5318280"/>
+            <a:ext cx="1986840" cy="2739960"/>
           </a:xfrm>
           <a:prstGeom prst="rect">
             <a:avLst/>
@@ -830,7 +801,7 @@
         <p:spPr>
           <a:xfrm>
             <a:off x="342720" y="5318280"/>
-            <a:ext cx="1987200" cy="2739960"/>
+            <a:ext cx="1986840" cy="2739960"/>
           </a:xfrm>
           <a:prstGeom prst="rect">
             <a:avLst/>
@@ -882,7 +853,7 @@
         <p:spPr>
           <a:xfrm>
             <a:off x="342720" y="394920"/>
-            <a:ext cx="6171480" cy="1653480"/>
+            <a:ext cx="6171120" cy="1653120"/>
           </a:xfrm>
           <a:prstGeom prst="rect">
             <a:avLst/>
@@ -911,7 +882,7 @@
         <p:spPr>
           <a:xfrm>
             <a:off x="342720" y="2317680"/>
-            <a:ext cx="6171840" cy="5744880"/>
+            <a:ext cx="6171480" cy="5744520"/>
           </a:xfrm>
           <a:prstGeom prst="rect">
             <a:avLst/>
@@ -962,7 +933,7 @@
         <p:spPr>
           <a:xfrm>
             <a:off x="342720" y="394920"/>
-            <a:ext cx="6171480" cy="1653480"/>
+            <a:ext cx="6171120" cy="1653120"/>
           </a:xfrm>
           <a:prstGeom prst="rect">
             <a:avLst/>
@@ -991,7 +962,7 @@
         <p:spPr>
           <a:xfrm>
             <a:off x="342720" y="2317680"/>
-            <a:ext cx="6171840" cy="5744880"/>
+            <a:ext cx="6171480" cy="5744520"/>
           </a:xfrm>
           <a:prstGeom prst="rect">
             <a:avLst/>
@@ -1043,7 +1014,7 @@
         <p:spPr>
           <a:xfrm>
             <a:off x="342720" y="394920"/>
-            <a:ext cx="6171480" cy="1653480"/>
+            <a:ext cx="6171120" cy="1653120"/>
           </a:xfrm>
           <a:prstGeom prst="rect">
             <a:avLst/>
@@ -1072,7 +1043,7 @@
         <p:spPr>
           <a:xfrm>
             <a:off x="342720" y="2317680"/>
-            <a:ext cx="3011760" cy="5744880"/>
+            <a:ext cx="3011400" cy="5744520"/>
           </a:xfrm>
           <a:prstGeom prst="rect">
             <a:avLst/>
@@ -1101,8 +1072,8 @@
         </p:nvSpPr>
         <p:spPr>
           <a:xfrm>
-            <a:off x="3505320" y="2317680"/>
-            <a:ext cx="3011760" cy="5744880"/>
+            <a:off x="3504960" y="2317680"/>
+            <a:ext cx="3011400" cy="5744520"/>
           </a:xfrm>
           <a:prstGeom prst="rect">
             <a:avLst/>
@@ -1154,7 +1125,7 @@
         <p:spPr>
           <a:xfrm>
             <a:off x="342720" y="394920"/>
-            <a:ext cx="6171480" cy="1653480"/>
+            <a:ext cx="6171120" cy="1653120"/>
           </a:xfrm>
           <a:prstGeom prst="rect">
             <a:avLst/>
@@ -1205,7 +1176,7 @@
         <p:spPr>
           <a:xfrm>
             <a:off x="342720" y="394920"/>
-            <a:ext cx="6171480" cy="7665840"/>
+            <a:ext cx="6171120" cy="7664040"/>
           </a:xfrm>
           <a:prstGeom prst="rect">
             <a:avLst/>
@@ -1256,7 +1227,7 @@
         <p:spPr>
           <a:xfrm>
             <a:off x="342720" y="394920"/>
-            <a:ext cx="6171480" cy="1653480"/>
+            <a:ext cx="6171120" cy="1653120"/>
           </a:xfrm>
           <a:prstGeom prst="rect">
             <a:avLst/>
@@ -1285,7 +1256,7 @@
         <p:spPr>
           <a:xfrm>
             <a:off x="342720" y="2317680"/>
-            <a:ext cx="3011760" cy="2739960"/>
+            <a:ext cx="3011400" cy="2739960"/>
           </a:xfrm>
           <a:prstGeom prst="rect">
             <a:avLst/>
@@ -1315,7 +1286,7 @@
         <p:spPr>
           <a:xfrm>
             <a:off x="342720" y="5318280"/>
-            <a:ext cx="3011760" cy="2739960"/>
+            <a:ext cx="3011400" cy="2739960"/>
           </a:xfrm>
           <a:prstGeom prst="rect">
             <a:avLst/>
@@ -1344,8 +1315,8 @@
         </p:nvSpPr>
         <p:spPr>
           <a:xfrm>
-            <a:off x="3505320" y="2317680"/>
-            <a:ext cx="3011760" cy="5744880"/>
+            <a:off x="3504960" y="2317680"/>
+            <a:ext cx="3011400" cy="5744520"/>
           </a:xfrm>
           <a:prstGeom prst="rect">
             <a:avLst/>
@@ -1397,7 +1368,7 @@
         <p:spPr>
           <a:xfrm>
             <a:off x="342720" y="394920"/>
-            <a:ext cx="6171480" cy="1653480"/>
+            <a:ext cx="6171120" cy="1653120"/>
           </a:xfrm>
           <a:prstGeom prst="rect">
             <a:avLst/>
@@ -1426,7 +1397,7 @@
         <p:spPr>
           <a:xfrm>
             <a:off x="342720" y="2317680"/>
-            <a:ext cx="3011760" cy="5744880"/>
+            <a:ext cx="3011400" cy="5744520"/>
           </a:xfrm>
           <a:prstGeom prst="rect">
             <a:avLst/>
@@ -1455,8 +1426,8 @@
         </p:nvSpPr>
         <p:spPr>
           <a:xfrm>
-            <a:off x="3505320" y="2317680"/>
-            <a:ext cx="3011760" cy="2739960"/>
+            <a:off x="3504960" y="2317680"/>
+            <a:ext cx="3011400" cy="2739960"/>
           </a:xfrm>
           <a:prstGeom prst="rect">
             <a:avLst/>
@@ -1485,8 +1456,8 @@
         </p:nvSpPr>
         <p:spPr>
           <a:xfrm>
-            <a:off x="3505320" y="5318280"/>
-            <a:ext cx="3011760" cy="2739960"/>
+            <a:off x="3504960" y="5318280"/>
+            <a:ext cx="3011400" cy="2739960"/>
           </a:xfrm>
           <a:prstGeom prst="rect">
             <a:avLst/>
@@ -1538,7 +1509,7 @@
         <p:spPr>
           <a:xfrm>
             <a:off x="342720" y="394920"/>
-            <a:ext cx="6171480" cy="1653480"/>
+            <a:ext cx="6171120" cy="1653120"/>
           </a:xfrm>
           <a:prstGeom prst="rect">
             <a:avLst/>
@@ -1567,7 +1538,7 @@
         <p:spPr>
           <a:xfrm>
             <a:off x="342720" y="2317680"/>
-            <a:ext cx="3011760" cy="2739960"/>
+            <a:ext cx="3011400" cy="2739960"/>
           </a:xfrm>
           <a:prstGeom prst="rect">
             <a:avLst/>
@@ -1596,8 +1567,8 @@
         </p:nvSpPr>
         <p:spPr>
           <a:xfrm>
-            <a:off x="3505320" y="2317680"/>
-            <a:ext cx="3011760" cy="2739960"/>
+            <a:off x="3504960" y="2317680"/>
+            <a:ext cx="3011400" cy="2739960"/>
           </a:xfrm>
           <a:prstGeom prst="rect">
             <a:avLst/>
@@ -1627,7 +1598,7 @@
         <p:spPr>
           <a:xfrm>
             <a:off x="342720" y="5318280"/>
-            <a:ext cx="6171840" cy="2739960"/>
+            <a:ext cx="6171480" cy="2739960"/>
           </a:xfrm>
           <a:prstGeom prst="rect">
             <a:avLst/>
@@ -1686,7 +1657,7 @@
         <p:spPr>
           <a:xfrm>
             <a:off x="342720" y="394920"/>
-            <a:ext cx="6171480" cy="1653480"/>
+            <a:ext cx="6171120" cy="1653120"/>
           </a:xfrm>
           <a:prstGeom prst="rect">
             <a:avLst/>
@@ -1699,13 +1670,7 @@
               <a:rPr b="0" lang="en-US" sz="1800" spc="-1" strike="noStrike">
                 <a:latin typeface="Arial"/>
               </a:rPr>
-              <a:t>Click to edit the title text </a:t>
-            </a:r>
-            <a:r>
-              <a:rPr b="0" lang="en-US" sz="1800" spc="-1" strike="noStrike">
-                <a:latin typeface="Arial"/>
-              </a:rPr>
-              <a:t>format</a:t>
+              <a:t>Click to edit the title text format</a:t>
             </a:r>
             <a:endParaRPr b="0" lang="en-US" sz="1800" spc="-1" strike="noStrike">
               <a:latin typeface="Arial"/>
@@ -1726,7 +1691,7 @@
         <p:spPr>
           <a:xfrm>
             <a:off x="342720" y="2317680"/>
-            <a:ext cx="6171840" cy="5744880"/>
+            <a:ext cx="6171480" cy="5744520"/>
           </a:xfrm>
           <a:prstGeom prst="rect">
             <a:avLst/>
@@ -1749,12 +1714,12 @@
               <a:buChar char=""/>
             </a:pPr>
             <a:r>
-              <a:rPr b="0" lang="en-US" sz="3200" spc="-1" strike="noStrike">
+              <a:rPr b="0" lang="en-US" sz="1800" spc="-1" strike="noStrike">
                 <a:latin typeface="Arial"/>
               </a:rPr>
               <a:t>Click to edit the outline text format</a:t>
             </a:r>
-            <a:endParaRPr b="0" lang="en-US" sz="3200" spc="-1" strike="noStrike">
+            <a:endParaRPr b="0" lang="en-US" sz="1800" spc="-1" strike="noStrike">
               <a:latin typeface="Arial"/>
             </a:endParaRPr>
           </a:p>
@@ -1771,12 +1736,12 @@
               <a:buChar char=""/>
             </a:pPr>
             <a:r>
-              <a:rPr b="0" lang="en-US" sz="2800" spc="-1" strike="noStrike">
+              <a:rPr b="0" lang="en-US" sz="1800" spc="-1" strike="noStrike">
                 <a:latin typeface="Arial"/>
               </a:rPr>
               <a:t>Second Outline Level</a:t>
             </a:r>
-            <a:endParaRPr b="0" lang="en-US" sz="2800" spc="-1" strike="noStrike">
+            <a:endParaRPr b="0" lang="en-US" sz="1800" spc="-1" strike="noStrike">
               <a:latin typeface="Arial"/>
             </a:endParaRPr>
           </a:p>
@@ -1793,12 +1758,12 @@
               <a:buChar char=""/>
             </a:pPr>
             <a:r>
-              <a:rPr b="0" lang="en-US" sz="2400" spc="-1" strike="noStrike">
+              <a:rPr b="0" lang="en-US" sz="1800" spc="-1" strike="noStrike">
                 <a:latin typeface="Arial"/>
               </a:rPr>
               <a:t>Third Outline Level</a:t>
             </a:r>
-            <a:endParaRPr b="0" lang="en-US" sz="2400" spc="-1" strike="noStrike">
+            <a:endParaRPr b="0" lang="en-US" sz="1800" spc="-1" strike="noStrike">
               <a:latin typeface="Arial"/>
             </a:endParaRPr>
           </a:p>
@@ -1815,12 +1780,12 @@
               <a:buChar char=""/>
             </a:pPr>
             <a:r>
-              <a:rPr b="0" lang="en-US" sz="2000" spc="-1" strike="noStrike">
+              <a:rPr b="0" lang="en-US" sz="1800" spc="-1" strike="noStrike">
                 <a:latin typeface="Arial"/>
               </a:rPr>
               <a:t>Fourth Outline Level</a:t>
             </a:r>
-            <a:endParaRPr b="0" lang="en-US" sz="2000" spc="-1" strike="noStrike">
+            <a:endParaRPr b="0" lang="en-US" sz="1800" spc="-1" strike="noStrike">
               <a:latin typeface="Arial"/>
             </a:endParaRPr>
           </a:p>
@@ -1837,12 +1802,12 @@
               <a:buChar char=""/>
             </a:pPr>
             <a:r>
-              <a:rPr b="0" lang="en-US" sz="2000" spc="-1" strike="noStrike">
+              <a:rPr b="0" lang="en-US" sz="1800" spc="-1" strike="noStrike">
                 <a:latin typeface="Arial"/>
               </a:rPr>
               <a:t>Fifth Outline Level</a:t>
             </a:r>
-            <a:endParaRPr b="0" lang="en-US" sz="2000" spc="-1" strike="noStrike">
+            <a:endParaRPr b="0" lang="en-US" sz="1800" spc="-1" strike="noStrike">
               <a:latin typeface="Arial"/>
             </a:endParaRPr>
           </a:p>
@@ -1859,12 +1824,12 @@
               <a:buChar char=""/>
             </a:pPr>
             <a:r>
-              <a:rPr b="0" lang="en-US" sz="2000" spc="-1" strike="noStrike">
+              <a:rPr b="0" lang="en-US" sz="1800" spc="-1" strike="noStrike">
                 <a:latin typeface="Arial"/>
               </a:rPr>
               <a:t>Sixth Outline Level</a:t>
             </a:r>
-            <a:endParaRPr b="0" lang="en-US" sz="2000" spc="-1" strike="noStrike">
+            <a:endParaRPr b="0" lang="en-US" sz="1800" spc="-1" strike="noStrike">
               <a:latin typeface="Arial"/>
             </a:endParaRPr>
           </a:p>
@@ -1881,12 +1846,12 @@
               <a:buChar char=""/>
             </a:pPr>
             <a:r>
-              <a:rPr b="0" lang="en-US" sz="2000" spc="-1" strike="noStrike">
+              <a:rPr b="0" lang="en-US" sz="1800" spc="-1" strike="noStrike">
                 <a:latin typeface="Arial"/>
               </a:rPr>
               <a:t>Seventh Outline Level</a:t>
             </a:r>
-            <a:endParaRPr b="0" lang="en-US" sz="2000" spc="-1" strike="noStrike">
+            <a:endParaRPr b="0" lang="en-US" sz="1800" spc="-1" strike="noStrike">
               <a:latin typeface="Arial"/>
             </a:endParaRPr>
           </a:p>
@@ -1938,7 +1903,7 @@
         <p:spPr>
           <a:xfrm>
             <a:off x="114480" y="9206640"/>
-            <a:ext cx="6600240" cy="943200"/>
+            <a:ext cx="6599880" cy="942840"/>
           </a:xfrm>
           <a:prstGeom prst="rect">
             <a:avLst/>
@@ -1968,7 +1933,7 @@
         <p:spPr>
           <a:xfrm>
             <a:off x="0" y="753840"/>
-            <a:ext cx="6857280" cy="1257840"/>
+            <a:ext cx="6856920" cy="1257480"/>
           </a:xfrm>
           <a:prstGeom prst="rect">
             <a:avLst/>
@@ -2003,9 +1968,6 @@
               <a:t>Towards automating and publishing workflow</a:t>
             </a:r>
             <a:endParaRPr b="0" lang="en-US" sz="2000" spc="-1" strike="noStrike">
-              <a:solidFill>
-                <a:srgbClr val="0070c0"/>
-              </a:solidFill>
               <a:latin typeface="Arial"/>
             </a:endParaRPr>
           </a:p>
@@ -2026,9 +1988,6 @@
               <a:t>analyses in Galaxy</a:t>
             </a:r>
             <a:endParaRPr b="0" lang="en-US" sz="2000" spc="-1" strike="noStrike">
-              <a:solidFill>
-                <a:srgbClr val="0070c0"/>
-              </a:solidFill>
               <a:latin typeface="Arial"/>
             </a:endParaRPr>
           </a:p>
@@ -2039,9 +1998,6 @@
               </a:lnSpc>
             </a:pPr>
             <a:endParaRPr b="0" lang="en-US" sz="2000" spc="-1" strike="noStrike">
-              <a:solidFill>
-                <a:srgbClr val="0070c0"/>
-              </a:solidFill>
               <a:latin typeface="Arial"/>
             </a:endParaRPr>
           </a:p>
@@ -2062,9 +2018,6 @@
               <a:t>Andrea Bagnacani, Markus Wolfien, Martin Scharm, Olaf Wolkenhauer</a:t>
             </a:r>
             <a:endParaRPr b="0" lang="en-US" sz="1200" spc="-1" strike="noStrike">
-              <a:solidFill>
-                <a:srgbClr val="0070c0"/>
-              </a:solidFill>
               <a:latin typeface="Arial"/>
             </a:endParaRPr>
           </a:p>
@@ -2079,7 +2032,7 @@
         <p:spPr>
           <a:xfrm>
             <a:off x="3291480" y="9201240"/>
-            <a:ext cx="1845360" cy="729360"/>
+            <a:ext cx="1845000" cy="729000"/>
           </a:xfrm>
           <a:prstGeom prst="rect">
             <a:avLst/>
@@ -2114,10 +2067,7 @@
               <a:t>Andrea Bagnacani</a:t>
             </a:r>
             <a:endParaRPr b="0" lang="en-US" sz="800" spc="-1" strike="noStrike">
-              <a:solidFill>
-                <a:srgbClr val="ffffff"/>
-              </a:solidFill>
-              <a:latin typeface="Cambria"/>
+              <a:latin typeface="Arial"/>
             </a:endParaRPr>
           </a:p>
           <a:p>
@@ -2129,7 +2079,7 @@
             <a:r>
               <a:rPr b="0" lang="en-US" sz="800" spc="-1" strike="noStrike" u="sng">
                 <a:solidFill>
-                  <a:srgbClr val="ffffff"/>
+                  <a:srgbClr val="0000ff"/>
                 </a:solidFill>
                 <a:uFillTx/>
                 <a:latin typeface="Cambria"/>
@@ -2139,10 +2089,7 @@
               <a:t>andrea.bagnacani@uni-rostock.de</a:t>
             </a:r>
             <a:endParaRPr b="0" lang="en-US" sz="800" spc="-1" strike="noStrike">
-              <a:solidFill>
-                <a:srgbClr val="ffffff"/>
-              </a:solidFill>
-              <a:latin typeface="Cambria"/>
+              <a:latin typeface="Arial"/>
             </a:endParaRPr>
           </a:p>
           <a:p>
@@ -2162,10 +2109,7 @@
               <a:t>Systems Biology and Bioinformatics</a:t>
             </a:r>
             <a:endParaRPr b="0" lang="en-US" sz="800" spc="-1" strike="noStrike">
-              <a:solidFill>
-                <a:srgbClr val="ffffff"/>
-              </a:solidFill>
-              <a:latin typeface="Cambria"/>
+              <a:latin typeface="Arial"/>
             </a:endParaRPr>
           </a:p>
           <a:p>
@@ -2185,10 +2129,7 @@
               <a:t>University of Rostock</a:t>
             </a:r>
             <a:endParaRPr b="0" lang="en-US" sz="800" spc="-1" strike="noStrike">
-              <a:solidFill>
-                <a:srgbClr val="ffffff"/>
-              </a:solidFill>
-              <a:latin typeface="Cambria"/>
+              <a:latin typeface="Arial"/>
             </a:endParaRPr>
           </a:p>
           <a:p>
@@ -2208,10 +2149,7 @@
               <a:t>www.sbi.uni-rostock.de</a:t>
             </a:r>
             <a:endParaRPr b="0" lang="en-US" sz="800" spc="-1" strike="noStrike">
-              <a:solidFill>
-                <a:srgbClr val="ffffff"/>
-              </a:solidFill>
-              <a:latin typeface="Cambria"/>
+              <a:latin typeface="Arial"/>
             </a:endParaRPr>
           </a:p>
         </p:txBody>
@@ -2225,7 +2163,7 @@
         <p:spPr>
           <a:xfrm>
             <a:off x="174600" y="1881360"/>
-            <a:ext cx="3117240" cy="240480"/>
+            <a:ext cx="3116880" cy="240120"/>
           </a:xfrm>
           <a:prstGeom prst="roundRect">
             <a:avLst>
@@ -2285,7 +2223,7 @@
         <p:spPr>
           <a:xfrm>
             <a:off x="5136480" y="56880"/>
-            <a:ext cx="1466280" cy="491400"/>
+            <a:ext cx="1465920" cy="491040"/>
           </a:xfrm>
           <a:prstGeom prst="rect">
             <a:avLst/>
@@ -2304,7 +2242,7 @@
         <p:spPr>
           <a:xfrm>
             <a:off x="114480" y="640080"/>
-            <a:ext cx="6600240" cy="9966960"/>
+            <a:ext cx="6599880" cy="9966600"/>
           </a:xfrm>
           <a:prstGeom prst="roundRect">
             <a:avLst>
@@ -2339,7 +2277,7 @@
         <p:spPr>
           <a:xfrm>
             <a:off x="991800" y="91440"/>
-            <a:ext cx="1226880" cy="411840"/>
+            <a:ext cx="1226520" cy="411480"/>
           </a:xfrm>
           <a:prstGeom prst="rect">
             <a:avLst/>
@@ -2362,7 +2300,7 @@
         <p:spPr>
           <a:xfrm>
             <a:off x="2416320" y="64080"/>
-            <a:ext cx="2534040" cy="520200"/>
+            <a:ext cx="2533680" cy="519840"/>
           </a:xfrm>
           <a:prstGeom prst="rect">
             <a:avLst/>
@@ -2385,7 +2323,7 @@
         <p:spPr>
           <a:xfrm>
             <a:off x="218880" y="36000"/>
-            <a:ext cx="581760" cy="822600"/>
+            <a:ext cx="581400" cy="822240"/>
           </a:xfrm>
           <a:prstGeom prst="rect">
             <a:avLst/>
@@ -2408,7 +2346,7 @@
         <p:spPr>
           <a:xfrm>
             <a:off x="146880" y="9252000"/>
-            <a:ext cx="3053520" cy="631800"/>
+            <a:ext cx="3053160" cy="631440"/>
           </a:xfrm>
           <a:prstGeom prst="rect">
             <a:avLst/>
@@ -2431,7 +2369,7 @@
         <p:spPr>
           <a:xfrm>
             <a:off x="150480" y="5172840"/>
-            <a:ext cx="3141360" cy="1938960"/>
+            <a:ext cx="3141000" cy="1938600"/>
           </a:xfrm>
           <a:prstGeom prst="rect">
             <a:avLst/>
@@ -2450,7 +2388,7 @@
         <p:spPr>
           <a:xfrm>
             <a:off x="3474720" y="7528320"/>
-            <a:ext cx="3184200" cy="240480"/>
+            <a:ext cx="3183840" cy="240120"/>
           </a:xfrm>
           <a:prstGeom prst="roundRect">
             <a:avLst>
@@ -2506,7 +2444,7 @@
         <p:spPr>
           <a:xfrm>
             <a:off x="91440" y="2139120"/>
-            <a:ext cx="3291840" cy="1733040"/>
+            <a:ext cx="3291480" cy="1732680"/>
           </a:xfrm>
           <a:prstGeom prst="rect">
             <a:avLst/>
@@ -2555,7 +2493,7 @@
         <p:spPr>
           <a:xfrm>
             <a:off x="3438720" y="7756200"/>
-            <a:ext cx="3291840" cy="1279080"/>
+            <a:ext cx="3291480" cy="1278720"/>
           </a:xfrm>
           <a:prstGeom prst="rect">
             <a:avLst/>
@@ -2934,7 +2872,7 @@
         <p:spPr>
           <a:xfrm>
             <a:off x="3619440" y="2194920"/>
-            <a:ext cx="2121840" cy="329400"/>
+            <a:ext cx="2121480" cy="329040"/>
           </a:xfrm>
           <a:prstGeom prst="rect">
             <a:avLst/>
@@ -2969,7 +2907,7 @@
               <a:t>Leverage on the Galaxy interactive tours</a:t>
             </a:r>
             <a:endParaRPr b="0" lang="en-US" sz="800" spc="-1" strike="noStrike">
-              <a:latin typeface="Cambria"/>
+              <a:latin typeface="Arial"/>
             </a:endParaRPr>
           </a:p>
           <a:p>
@@ -2989,7 +2927,7 @@
               <a:t>to provide users interchangeable tools</a:t>
             </a:r>
             <a:endParaRPr b="0" lang="en-US" sz="800" spc="-1" strike="noStrike">
-              <a:latin typeface="Cambria"/>
+              <a:latin typeface="Arial"/>
             </a:endParaRPr>
           </a:p>
         </p:txBody>
@@ -3003,7 +2941,7 @@
         <p:spPr>
           <a:xfrm>
             <a:off x="3481200" y="2901600"/>
-            <a:ext cx="2351520" cy="501120"/>
+            <a:ext cx="2351160" cy="500760"/>
           </a:xfrm>
           <a:prstGeom prst="rect">
             <a:avLst/>
@@ -3038,7 +2976,7 @@
               <a:t>Gather EDAM ontology terms describing</a:t>
             </a:r>
             <a:endParaRPr b="0" lang="en-US" sz="800" spc="-1" strike="noStrike">
-              <a:latin typeface="Cambria"/>
+              <a:latin typeface="Arial"/>
             </a:endParaRPr>
           </a:p>
           <a:p>
@@ -3058,7 +2996,7 @@
               <a:t>each tool in terms of operations, input,</a:t>
             </a:r>
             <a:endParaRPr b="0" lang="en-US" sz="800" spc="-1" strike="noStrike">
-              <a:latin typeface="Cambria"/>
+              <a:latin typeface="Arial"/>
             </a:endParaRPr>
           </a:p>
           <a:p>
@@ -3078,7 +3016,7 @@
               <a:t>and output formats</a:t>
             </a:r>
             <a:endParaRPr b="0" lang="en-US" sz="800" spc="-1" strike="noStrike">
-              <a:latin typeface="Cambria"/>
+              <a:latin typeface="Arial"/>
             </a:endParaRPr>
           </a:p>
         </p:txBody>
@@ -3092,7 +3030,7 @@
         <p:spPr>
           <a:xfrm>
             <a:off x="3517200" y="3765600"/>
-            <a:ext cx="2315520" cy="398520"/>
+            <a:ext cx="2315160" cy="398160"/>
           </a:xfrm>
           <a:prstGeom prst="rect">
             <a:avLst/>
@@ -3127,7 +3065,7 @@
               <a:t>Mine Galaxy instances for user-tracked</a:t>
             </a:r>
             <a:endParaRPr b="0" lang="en-US" sz="800" spc="-1" strike="noStrike">
-              <a:latin typeface="Cambria"/>
+              <a:latin typeface="Arial"/>
             </a:endParaRPr>
           </a:p>
           <a:p>
@@ -3147,7 +3085,7 @@
               <a:t>data: tool chaining, parametrization, formats</a:t>
             </a:r>
             <a:endParaRPr b="0" lang="en-US" sz="800" spc="-1" strike="noStrike">
-              <a:latin typeface="Cambria"/>
+              <a:latin typeface="Arial"/>
             </a:endParaRPr>
           </a:p>
         </p:txBody>
@@ -3161,7 +3099,7 @@
         <p:spPr>
           <a:xfrm>
             <a:off x="3606480" y="2197800"/>
-            <a:ext cx="2134800" cy="362520"/>
+            <a:ext cx="2134440" cy="362160"/>
           </a:xfrm>
           <a:prstGeom prst="roundRect">
             <a:avLst>
@@ -3192,7 +3130,7 @@
         <p:spPr>
           <a:xfrm>
             <a:off x="3606840" y="2881800"/>
-            <a:ext cx="2134440" cy="520920"/>
+            <a:ext cx="2134080" cy="520560"/>
           </a:xfrm>
           <a:prstGeom prst="roundRect">
             <a:avLst>
@@ -3227,7 +3165,7 @@
         <p:spPr>
           <a:xfrm>
             <a:off x="6054480" y="2198520"/>
-            <a:ext cx="401760" cy="406440"/>
+            <a:ext cx="401400" cy="406080"/>
           </a:xfrm>
           <a:prstGeom prst="rect">
             <a:avLst/>
@@ -3246,7 +3184,7 @@
         <p:spPr>
           <a:xfrm>
             <a:off x="3606840" y="3745800"/>
-            <a:ext cx="2134440" cy="418320"/>
+            <a:ext cx="2134080" cy="417960"/>
           </a:xfrm>
           <a:prstGeom prst="roundRect">
             <a:avLst>
@@ -3281,7 +3219,7 @@
         <p:spPr>
           <a:xfrm>
             <a:off x="6057720" y="2978280"/>
-            <a:ext cx="389160" cy="385560"/>
+            <a:ext cx="388800" cy="385200"/>
           </a:xfrm>
           <a:prstGeom prst="rect">
             <a:avLst/>
@@ -3300,7 +3238,7 @@
         <p:spPr>
           <a:xfrm>
             <a:off x="174960" y="4113720"/>
-            <a:ext cx="3116880" cy="240480"/>
+            <a:ext cx="3116520" cy="240120"/>
           </a:xfrm>
           <a:prstGeom prst="roundRect">
             <a:avLst>
@@ -3356,7 +3294,7 @@
         <p:spPr>
           <a:xfrm>
             <a:off x="91440" y="6432120"/>
-            <a:ext cx="3382920" cy="1733040"/>
+            <a:ext cx="3382560" cy="1732680"/>
           </a:xfrm>
           <a:prstGeom prst="rect">
             <a:avLst/>
@@ -3382,7 +3320,7 @@
         <p:spPr>
           <a:xfrm>
             <a:off x="3403440" y="5928120"/>
-            <a:ext cx="3291840" cy="1409400"/>
+            <a:ext cx="3291480" cy="1409040"/>
           </a:xfrm>
           <a:prstGeom prst="rect">
             <a:avLst/>
@@ -3406,7 +3344,7 @@
                 <a:spcPct val="100000"/>
               </a:lnSpc>
             </a:pPr>
-            <a:endParaRPr b="0" lang="en-US" sz="800" spc="-1" strike="noStrike">
+            <a:endParaRPr b="0" lang="en-US" sz="1800" spc="-1" strike="noStrike">
               <a:latin typeface="Arial"/>
             </a:endParaRPr>
           </a:p>
@@ -3431,7 +3369,7 @@
         <p:spPr>
           <a:xfrm>
             <a:off x="91440" y="7140600"/>
-            <a:ext cx="3291840" cy="1515240"/>
+            <a:ext cx="3291480" cy="1514880"/>
           </a:xfrm>
           <a:prstGeom prst="rect">
             <a:avLst/>
@@ -3473,14 +3411,7 @@
                 <a:latin typeface="Cambria"/>
                 <a:ea typeface="ＭＳ Ｐゴシック"/>
               </a:rPr>
-              <a:t> The recommendation system traces a path from the beginning of a Life Science data analysis to its end. Here, researchers can decide which path to walk towards the completion of the desired analysis by providing an </a:t>
-            </a:r>
-            <a:r>
-              <a:rPr b="0" lang="en-US" sz="800" spc="-1" strike="noStrike">
-                <a:latin typeface="Cambria"/>
-                <a:ea typeface="ＭＳ Ｐゴシック"/>
-              </a:rPr>
-              <a:t>input dataset and an analysis goal.</a:t>
+              <a:t> The recommendation system traces a path from the beginning of a Life Science data analysis to its end. Here, researchers can decide which path to walk towards the completion of the desired analysis by providing an input dataset and an analysis goal.</a:t>
             </a:r>
             <a:endParaRPr b="0" lang="en-US" sz="800" spc="-1" strike="noStrike">
               <a:latin typeface="Arial"/>
@@ -3527,7 +3458,7 @@
             </a:endParaRPr>
           </a:p>
           <a:p>
-            <a:pPr marL="216000" indent="-216000" algn="just">
+            <a:pPr marL="216000" indent="-215640" algn="just">
               <a:lnSpc>
                 <a:spcPct val="100000"/>
               </a:lnSpc>
@@ -3545,6 +3476,9 @@
             </a:pPr>
             <a:r>
               <a:rPr b="0" lang="en-US" sz="800" spc="-1" strike="noStrike">
+                <a:solidFill>
+                  <a:srgbClr val="000000"/>
+                </a:solidFill>
                 <a:latin typeface="Cambria"/>
                 <a:ea typeface="ＭＳ Ｐゴシック"/>
               </a:rPr>
@@ -3552,11 +3486,10 @@
             </a:r>
             <a:endParaRPr b="0" lang="en-US" sz="800" spc="-1" strike="noStrike">
               <a:latin typeface="Arial"/>
-              <a:ea typeface="Noto Sans CJK SC Regular"/>
-            </a:endParaRPr>
-          </a:p>
-          <a:p>
-            <a:pPr marL="216000" indent="-216000" algn="just">
+            </a:endParaRPr>
+          </a:p>
+          <a:p>
+            <a:pPr marL="216000" indent="-215640" algn="just">
               <a:lnSpc>
                 <a:spcPct val="100000"/>
               </a:lnSpc>
@@ -3574,6 +3507,9 @@
             </a:pPr>
             <a:r>
               <a:rPr b="0" lang="en-US" sz="800" spc="-1" strike="noStrike">
+                <a:solidFill>
+                  <a:srgbClr val="000000"/>
+                </a:solidFill>
                 <a:latin typeface="Cambria"/>
                 <a:ea typeface="ＭＳ Ｐゴシック"/>
               </a:rPr>
@@ -3581,7 +3517,6 @@
             </a:r>
             <a:endParaRPr b="0" lang="en-US" sz="800" spc="-1" strike="noStrike">
               <a:latin typeface="Arial"/>
-              <a:ea typeface="Noto Sans CJK SC Regular"/>
             </a:endParaRPr>
           </a:p>
         </p:txBody>
@@ -3595,7 +3530,7 @@
         <p:spPr>
           <a:xfrm>
             <a:off x="91440" y="4368600"/>
-            <a:ext cx="3291840" cy="752040"/>
+            <a:ext cx="3291480" cy="751680"/>
           </a:xfrm>
           <a:prstGeom prst="rect">
             <a:avLst/>
@@ -3614,7 +3549,7 @@
         <p:txBody>
           <a:bodyPr lIns="90000" rIns="90000" tIns="45000" bIns="45000"/>
           <a:p>
-            <a:pPr marL="216000" indent="-216000" algn="just">
+            <a:pPr marL="216000" indent="-215640" algn="just">
               <a:lnSpc>
                 <a:spcPct val="100000"/>
               </a:lnSpc>
@@ -3642,11 +3577,10 @@
             </a:r>
             <a:endParaRPr b="0" lang="en-US" sz="800" spc="-1" strike="noStrike">
               <a:latin typeface="Arial"/>
-              <a:ea typeface="Noto Sans CJK SC Regular"/>
-            </a:endParaRPr>
-          </a:p>
-          <a:p>
-            <a:pPr marL="216000" indent="-216000" algn="just">
+            </a:endParaRPr>
+          </a:p>
+          <a:p>
+            <a:pPr marL="216000" indent="-215640" algn="just">
               <a:lnSpc>
                 <a:spcPct val="100000"/>
               </a:lnSpc>
@@ -3674,11 +3608,10 @@
             </a:r>
             <a:endParaRPr b="0" lang="en-US" sz="800" spc="-1" strike="noStrike">
               <a:latin typeface="Arial"/>
-              <a:ea typeface="Noto Sans CJK SC Regular"/>
-            </a:endParaRPr>
-          </a:p>
-          <a:p>
-            <a:pPr marL="216000" indent="-216000" algn="just">
+            </a:endParaRPr>
+          </a:p>
+          <a:p>
+            <a:pPr marL="216000" indent="-215640" algn="just">
               <a:lnSpc>
                 <a:spcPct val="100000"/>
               </a:lnSpc>
@@ -3706,11 +3639,10 @@
             </a:r>
             <a:endParaRPr b="0" lang="en-US" sz="800" spc="-1" strike="noStrike">
               <a:latin typeface="Arial"/>
-              <a:ea typeface="Noto Sans CJK SC Regular"/>
-            </a:endParaRPr>
-          </a:p>
-          <a:p>
-            <a:pPr marL="216000" indent="-216000" algn="just">
+            </a:endParaRPr>
+          </a:p>
+          <a:p>
+            <a:pPr marL="216000" indent="-215640" algn="just">
               <a:lnSpc>
                 <a:spcPct val="100000"/>
               </a:lnSpc>
@@ -3738,7 +3670,6 @@
             </a:r>
             <a:endParaRPr b="0" lang="en-US" sz="800" spc="-1" strike="noStrike">
               <a:latin typeface="Arial"/>
-              <a:ea typeface="Noto Sans CJK SC Regular"/>
             </a:endParaRPr>
           </a:p>
         </p:txBody>
@@ -3752,7 +3683,7 @@
         <p:spPr>
           <a:xfrm>
             <a:off x="3522600" y="1881720"/>
-            <a:ext cx="3117240" cy="240480"/>
+            <a:ext cx="3116880" cy="240120"/>
           </a:xfrm>
           <a:prstGeom prst="roundRect">
             <a:avLst>
@@ -3791,17 +3722,7 @@
                 <a:latin typeface="Cambria"/>
                 <a:ea typeface="ＭＳ Ｐゴシック"/>
               </a:rPr>
-              <a:t>Towards the automation of workflow </a:t>
-            </a:r>
-            <a:r>
-              <a:rPr b="0" lang="en-US" sz="1000" spc="-1" strike="noStrike">
-                <a:solidFill>
-                  <a:srgbClr val="ffffff"/>
-                </a:solidFill>
-                <a:latin typeface="Cambria"/>
-                <a:ea typeface="ＭＳ Ｐゴシック"/>
-              </a:rPr>
-              <a:t>construction</a:t>
+              <a:t>Towards the automation of workflow construction</a:t>
             </a:r>
             <a:endParaRPr b="0" lang="en-US" sz="1000" spc="-1" strike="noStrike">
               <a:latin typeface="Arial"/>
@@ -3822,7 +3743,7 @@
         <p:spPr>
           <a:xfrm>
             <a:off x="6015240" y="3736440"/>
-            <a:ext cx="487080" cy="688680"/>
+            <a:ext cx="486720" cy="688320"/>
           </a:xfrm>
           <a:prstGeom prst="rect">
             <a:avLst/>
@@ -3832,23 +3753,34 @@
           </a:ln>
         </p:spPr>
       </p:pic>
-      <p:cxnSp>
-        <p:nvCxnSpPr>
-          <p:cNvPr id="72" name="Line 21"/>
-          <p:cNvCxnSpPr>
-            <a:stCxn id="60" idx="79"/>
-            <a:endCxn id="61" idx="21"/>
-          </p:cNvCxnSpPr>
-          <p:nvPr/>
-        </p:nvCxnSpPr>
+      <p:sp>
+        <p:nvSpPr>
+          <p:cNvPr id="72" name="CustomShape 21"/>
+          <p:cNvSpPr/>
+          <p:nvPr/>
+        </p:nvSpPr>
         <p:spPr>
           <a:xfrm>
             <a:off x="4673880" y="2560320"/>
-            <a:ext cx="360" cy="321840"/>
-          </a:xfrm>
-          <a:prstGeom prst="straightConnector1">
-            <a:avLst/>
-          </a:prstGeom>
+            <a:ext cx="360" cy="321480"/>
+          </a:xfrm>
+          <a:custGeom>
+            <a:avLst/>
+            <a:gdLst/>
+            <a:ahLst/>
+            <a:rect l="l" t="t" r="r" b="b"/>
+            <a:pathLst>
+              <a:path w="21600" h="21600">
+                <a:moveTo>
+                  <a:pt x="0" y="0"/>
+                </a:moveTo>
+                <a:lnTo>
+                  <a:pt x="21600" y="21600"/>
+                </a:lnTo>
+              </a:path>
+            </a:pathLst>
+          </a:custGeom>
+          <a:noFill/>
           <a:ln w="10080">
             <a:solidFill>
               <a:srgbClr val="00bfff"/>
@@ -3857,24 +3789,41 @@
             <a:tailEnd len="med" type="triangle" w="med"/>
           </a:ln>
         </p:spPr>
-      </p:cxnSp>
-      <p:cxnSp>
-        <p:nvCxnSpPr>
-          <p:cNvPr id="73" name="Line 22"/>
-          <p:cNvCxnSpPr>
-            <a:stCxn id="61" idx="68"/>
-            <a:endCxn id="63" idx="19"/>
-          </p:cNvCxnSpPr>
-          <p:nvPr/>
-        </p:nvCxnSpPr>
+        <p:style>
+          <a:lnRef idx="0"/>
+          <a:fillRef idx="0"/>
+          <a:effectRef idx="0"/>
+          <a:fontRef idx="minor"/>
+        </p:style>
+      </p:sp>
+      <p:sp>
+        <p:nvSpPr>
+          <p:cNvPr id="73" name="CustomShape 22"/>
+          <p:cNvSpPr/>
+          <p:nvPr/>
+        </p:nvSpPr>
         <p:spPr>
           <a:xfrm>
             <a:off x="4673880" y="3402720"/>
-            <a:ext cx="360" cy="343440"/>
-          </a:xfrm>
-          <a:prstGeom prst="straightConnector1">
-            <a:avLst/>
-          </a:prstGeom>
+            <a:ext cx="360" cy="343080"/>
+          </a:xfrm>
+          <a:custGeom>
+            <a:avLst/>
+            <a:gdLst/>
+            <a:ahLst/>
+            <a:rect l="l" t="t" r="r" b="b"/>
+            <a:pathLst>
+              <a:path w="21600" h="21600">
+                <a:moveTo>
+                  <a:pt x="0" y="0"/>
+                </a:moveTo>
+                <a:lnTo>
+                  <a:pt x="21600" y="21600"/>
+                </a:lnTo>
+              </a:path>
+            </a:pathLst>
+          </a:custGeom>
+          <a:noFill/>
           <a:ln w="6480">
             <a:solidFill>
               <a:srgbClr val="00bfff"/>
@@ -3883,581 +3832,6 @@
             <a:tailEnd len="med" type="triangle" w="med"/>
           </a:ln>
         </p:spPr>
-      </p:cxnSp>
-      <p:pic>
-        <p:nvPicPr>
-          <p:cNvPr id="74" name="" descr=""/>
-          <p:cNvPicPr/>
-          <p:nvPr/>
-        </p:nvPicPr>
-        <p:blipFill>
-          <a:blip r:embed="rId11"/>
-          <a:stretch/>
-        </p:blipFill>
-        <p:spPr>
-          <a:xfrm>
-            <a:off x="4093200" y="4461120"/>
-            <a:ext cx="2068200" cy="2834640"/>
-          </a:xfrm>
-          <a:prstGeom prst="rect">
-            <a:avLst/>
-          </a:prstGeom>
-          <a:ln>
-            <a:noFill/>
-          </a:ln>
-        </p:spPr>
-      </p:pic>
-      <p:sp>
-        <p:nvSpPr>
-          <p:cNvPr id="75" name="TextShape 23"/>
-          <p:cNvSpPr txBox="1"/>
-          <p:nvPr/>
-        </p:nvSpPr>
-        <p:spPr>
-          <a:xfrm>
-            <a:off x="5518080" y="5724000"/>
-            <a:ext cx="914400" cy="207720"/>
-          </a:xfrm>
-          <a:prstGeom prst="rect">
-            <a:avLst/>
-          </a:prstGeom>
-          <a:noFill/>
-          <a:ln>
-            <a:noFill/>
-          </a:ln>
-        </p:spPr>
-        <p:txBody>
-          <a:bodyPr lIns="90000" rIns="90000" tIns="45000" bIns="45000"/>
-          <a:p>
-            <a:r>
-              <a:rPr b="1" lang="en-US" sz="800" spc="-1" strike="noStrike">
-                <a:solidFill>
-                  <a:srgbClr val="2f5597"/>
-                </a:solidFill>
-                <a:latin typeface="Cambria"/>
-              </a:rPr>
-              <a:t>Training </a:t>
-            </a:r>
-            <a:r>
-              <a:rPr b="1" lang="en-US" sz="800" spc="-1" strike="noStrike">
-                <a:solidFill>
-                  <a:srgbClr val="2f5597"/>
-                </a:solidFill>
-                <a:latin typeface="Cambria"/>
-              </a:rPr>
-              <a:t>events</a:t>
-            </a:r>
-            <a:endParaRPr b="1" lang="en-US" sz="800" spc="-1" strike="noStrike">
-              <a:solidFill>
-                <a:srgbClr val="2f5597"/>
-              </a:solidFill>
-              <a:latin typeface="Cambria"/>
-            </a:endParaRPr>
-          </a:p>
-        </p:txBody>
-      </p:sp>
-      <p:sp>
-        <p:nvSpPr>
-          <p:cNvPr id="76" name="TextShape 24"/>
-          <p:cNvSpPr txBox="1"/>
-          <p:nvPr/>
-        </p:nvSpPr>
-        <p:spPr>
-          <a:xfrm>
-            <a:off x="3605040" y="5652720"/>
-            <a:ext cx="1427040" cy="559800"/>
-          </a:xfrm>
-          <a:prstGeom prst="rect">
-            <a:avLst/>
-          </a:prstGeom>
-          <a:noFill/>
-          <a:ln>
-            <a:noFill/>
-          </a:ln>
-        </p:spPr>
-        <p:txBody>
-          <a:bodyPr lIns="90000" rIns="90000" tIns="45000" bIns="45000"/>
-          <a:p>
-            <a:r>
-              <a:rPr b="1" lang="en-US" sz="800" spc="-1" strike="noStrike">
-                <a:solidFill>
-                  <a:srgbClr val="ff1493"/>
-                </a:solidFill>
-                <a:latin typeface="Cambria"/>
-              </a:rPr>
-              <a:t>Galaxy </a:t>
-            </a:r>
-            <a:r>
-              <a:rPr b="1" lang="en-US" sz="800" spc="-1" strike="noStrike">
-                <a:solidFill>
-                  <a:srgbClr val="ff1493"/>
-                </a:solidFill>
-                <a:latin typeface="Cambria"/>
-              </a:rPr>
-              <a:t>Interacti</a:t>
-            </a:r>
-            <a:r>
-              <a:rPr b="1" lang="en-US" sz="800" spc="-1" strike="noStrike">
-                <a:solidFill>
-                  <a:srgbClr val="ff1493"/>
-                </a:solidFill>
-                <a:latin typeface="Cambria"/>
-              </a:rPr>
-              <a:t>ve</a:t>
-            </a:r>
-            <a:endParaRPr b="1" lang="en-US" sz="800" spc="-1" strike="noStrike">
-              <a:solidFill>
-                <a:srgbClr val="ff1493"/>
-              </a:solidFill>
-              <a:latin typeface="Cambria"/>
-            </a:endParaRPr>
-          </a:p>
-          <a:p>
-            <a:r>
-              <a:rPr b="1" lang="en-US" sz="800" spc="-1" strike="noStrike">
-                <a:solidFill>
-                  <a:srgbClr val="ff1493"/>
-                </a:solidFill>
-                <a:latin typeface="Cambria"/>
-              </a:rPr>
-              <a:t>Recomm</a:t>
-            </a:r>
-            <a:r>
-              <a:rPr b="1" lang="en-US" sz="800" spc="-1" strike="noStrike">
-                <a:solidFill>
-                  <a:srgbClr val="ff1493"/>
-                </a:solidFill>
-                <a:latin typeface="Cambria"/>
-              </a:rPr>
-              <a:t>endation </a:t>
-            </a:r>
-            <a:r>
-              <a:rPr b="1" lang="en-US" sz="800" spc="-1" strike="noStrike">
-                <a:solidFill>
-                  <a:srgbClr val="ff1493"/>
-                </a:solidFill>
-                <a:latin typeface="Cambria"/>
-              </a:rPr>
-              <a:t>system</a:t>
-            </a:r>
-            <a:endParaRPr b="1" lang="en-US" sz="800" spc="-1" strike="noStrike">
-              <a:solidFill>
-                <a:srgbClr val="ff1493"/>
-              </a:solidFill>
-              <a:latin typeface="Cambria"/>
-            </a:endParaRPr>
-          </a:p>
-        </p:txBody>
-      </p:sp>
-      <p:sp>
-        <p:nvSpPr>
-          <p:cNvPr id="77" name="TextShape 25"/>
-          <p:cNvSpPr txBox="1"/>
-          <p:nvPr/>
-        </p:nvSpPr>
-        <p:spPr>
-          <a:xfrm>
-            <a:off x="4829040" y="4572720"/>
-            <a:ext cx="914400" cy="207720"/>
-          </a:xfrm>
-          <a:prstGeom prst="rect">
-            <a:avLst/>
-          </a:prstGeom>
-          <a:noFill/>
-          <a:ln>
-            <a:noFill/>
-          </a:ln>
-        </p:spPr>
-        <p:txBody>
-          <a:bodyPr lIns="90000" rIns="90000" tIns="45000" bIns="45000"/>
-          <a:p>
-            <a:r>
-              <a:rPr b="1" lang="en-US" sz="800" spc="-1" strike="noStrike">
-                <a:solidFill>
-                  <a:srgbClr val="ff1493"/>
-                </a:solidFill>
-                <a:latin typeface="Cambria"/>
-              </a:rPr>
-              <a:t>Galaxy </a:t>
-            </a:r>
-            <a:r>
-              <a:rPr b="1" lang="en-US" sz="800" spc="-1" strike="noStrike">
-                <a:solidFill>
-                  <a:srgbClr val="ff1493"/>
-                </a:solidFill>
-                <a:latin typeface="Cambria"/>
-              </a:rPr>
-              <a:t>Tours</a:t>
-            </a:r>
-            <a:endParaRPr b="1" lang="en-US" sz="800" spc="-1" strike="noStrike">
-              <a:solidFill>
-                <a:srgbClr val="ff1493"/>
-              </a:solidFill>
-              <a:latin typeface="Cambria"/>
-            </a:endParaRPr>
-          </a:p>
-        </p:txBody>
-      </p:sp>
-      <p:sp>
-        <p:nvSpPr>
-          <p:cNvPr id="78" name="TextShape 26"/>
-          <p:cNvSpPr txBox="1"/>
-          <p:nvPr/>
-        </p:nvSpPr>
-        <p:spPr>
-          <a:xfrm>
-            <a:off x="3713040" y="5904360"/>
-            <a:ext cx="914400" cy="207720"/>
-          </a:xfrm>
-          <a:prstGeom prst="rect">
-            <a:avLst/>
-          </a:prstGeom>
-          <a:noFill/>
-          <a:ln>
-            <a:noFill/>
-          </a:ln>
-        </p:spPr>
-        <p:txBody>
-          <a:bodyPr lIns="90000" rIns="90000" tIns="45000" bIns="45000"/>
-          <a:p>
-            <a:r>
-              <a:rPr b="1" lang="en-US" sz="800" spc="-1" strike="noStrike">
-                <a:solidFill>
-                  <a:srgbClr val="000000"/>
-                </a:solidFill>
-                <a:latin typeface="Cambria"/>
-              </a:rPr>
-              <a:t>Hackathon</a:t>
-            </a:r>
-            <a:endParaRPr b="1" lang="en-US" sz="800" spc="-1" strike="noStrike">
-              <a:solidFill>
-                <a:srgbClr val="000000"/>
-              </a:solidFill>
-              <a:latin typeface="Cambria"/>
-            </a:endParaRPr>
-          </a:p>
-        </p:txBody>
-      </p:sp>
-      <p:sp>
-        <p:nvSpPr>
-          <p:cNvPr id="79" name="TextShape 27"/>
-          <p:cNvSpPr txBox="1"/>
-          <p:nvPr/>
-        </p:nvSpPr>
-        <p:spPr>
-          <a:xfrm>
-            <a:off x="4937040" y="4464360"/>
-            <a:ext cx="914400" cy="207720"/>
-          </a:xfrm>
-          <a:prstGeom prst="rect">
-            <a:avLst/>
-          </a:prstGeom>
-          <a:noFill/>
-          <a:ln>
-            <a:noFill/>
-          </a:ln>
-        </p:spPr>
-        <p:txBody>
-          <a:bodyPr lIns="90000" rIns="90000" tIns="45000" bIns="45000"/>
-          <a:p>
-            <a:r>
-              <a:rPr b="1" lang="en-US" sz="800" spc="-1" strike="noStrike">
-                <a:solidFill>
-                  <a:srgbClr val="2f5597"/>
-                </a:solidFill>
-                <a:latin typeface="Cambria"/>
-              </a:rPr>
-              <a:t>Training </a:t>
-            </a:r>
-            <a:r>
-              <a:rPr b="1" lang="en-US" sz="800" spc="-1" strike="noStrike">
-                <a:solidFill>
-                  <a:srgbClr val="2f5597"/>
-                </a:solidFill>
-                <a:latin typeface="Cambria"/>
-              </a:rPr>
-              <a:t>events</a:t>
-            </a:r>
-            <a:endParaRPr b="1" lang="en-US" sz="800" spc="-1" strike="noStrike">
-              <a:solidFill>
-                <a:srgbClr val="2f5597"/>
-              </a:solidFill>
-              <a:latin typeface="Cambria"/>
-            </a:endParaRPr>
-          </a:p>
-        </p:txBody>
-      </p:sp>
-      <p:sp>
-        <p:nvSpPr>
-          <p:cNvPr id="80" name="TextShape 28"/>
-          <p:cNvSpPr txBox="1"/>
-          <p:nvPr/>
-        </p:nvSpPr>
-        <p:spPr>
-          <a:xfrm>
-            <a:off x="5621040" y="5869080"/>
-            <a:ext cx="914400" cy="207720"/>
-          </a:xfrm>
-          <a:prstGeom prst="rect">
-            <a:avLst/>
-          </a:prstGeom>
-          <a:noFill/>
-          <a:ln>
-            <a:noFill/>
-          </a:ln>
-        </p:spPr>
-        <p:txBody>
-          <a:bodyPr lIns="90000" rIns="90000" tIns="45000" bIns="45000"/>
-          <a:p>
-            <a:r>
-              <a:rPr b="1" lang="en-US" sz="800" spc="-1" strike="noStrike">
-                <a:solidFill>
-                  <a:srgbClr val="ff1493"/>
-                </a:solidFill>
-                <a:latin typeface="Cambria"/>
-              </a:rPr>
-              <a:t>Galaxy </a:t>
-            </a:r>
-            <a:r>
-              <a:rPr b="1" lang="en-US" sz="800" spc="-1" strike="noStrike">
-                <a:solidFill>
-                  <a:srgbClr val="ff1493"/>
-                </a:solidFill>
-                <a:latin typeface="Cambria"/>
-              </a:rPr>
-              <a:t>Flavor</a:t>
-            </a:r>
-            <a:endParaRPr b="1" lang="en-US" sz="800" spc="-1" strike="noStrike">
-              <a:solidFill>
-                <a:srgbClr val="ff1493"/>
-              </a:solidFill>
-              <a:latin typeface="Cambria"/>
-            </a:endParaRPr>
-          </a:p>
-        </p:txBody>
-      </p:sp>
-      <p:sp>
-        <p:nvSpPr>
-          <p:cNvPr id="81" name="TextShape 29"/>
-          <p:cNvSpPr txBox="1"/>
-          <p:nvPr/>
-        </p:nvSpPr>
-        <p:spPr>
-          <a:xfrm>
-            <a:off x="3713040" y="7021080"/>
-            <a:ext cx="914400" cy="207720"/>
-          </a:xfrm>
-          <a:prstGeom prst="rect">
-            <a:avLst/>
-          </a:prstGeom>
-          <a:noFill/>
-          <a:ln>
-            <a:noFill/>
-          </a:ln>
-        </p:spPr>
-        <p:txBody>
-          <a:bodyPr lIns="90000" rIns="90000" tIns="45000" bIns="45000"/>
-          <a:p>
-            <a:r>
-              <a:rPr b="1" lang="en-US" sz="800" spc="-1" strike="noStrike">
-                <a:solidFill>
-                  <a:srgbClr val="ff1493"/>
-                </a:solidFill>
-                <a:latin typeface="Cambria"/>
-              </a:rPr>
-              <a:t>G</a:t>
-            </a:r>
-            <a:r>
-              <a:rPr b="1" lang="en-US" sz="800" spc="-1" strike="noStrike">
-                <a:solidFill>
-                  <a:srgbClr val="ff1493"/>
-                </a:solidFill>
-                <a:latin typeface="Cambria"/>
-              </a:rPr>
-              <a:t>al</a:t>
-            </a:r>
-            <a:r>
-              <a:rPr b="1" lang="en-US" sz="800" spc="-1" strike="noStrike">
-                <a:solidFill>
-                  <a:srgbClr val="ff1493"/>
-                </a:solidFill>
-                <a:latin typeface="Cambria"/>
-              </a:rPr>
-              <a:t>a</a:t>
-            </a:r>
-            <a:r>
-              <a:rPr b="1" lang="en-US" sz="800" spc="-1" strike="noStrike">
-                <a:solidFill>
-                  <a:srgbClr val="ff1493"/>
-                </a:solidFill>
-                <a:latin typeface="Cambria"/>
-              </a:rPr>
-              <a:t>x</a:t>
-            </a:r>
-            <a:r>
-              <a:rPr b="1" lang="en-US" sz="800" spc="-1" strike="noStrike">
-                <a:solidFill>
-                  <a:srgbClr val="ff1493"/>
-                </a:solidFill>
-                <a:latin typeface="Cambria"/>
-              </a:rPr>
-              <a:t>y </a:t>
-            </a:r>
-            <a:r>
-              <a:rPr b="1" lang="en-US" sz="800" spc="-1" strike="noStrike">
-                <a:solidFill>
-                  <a:srgbClr val="ff1493"/>
-                </a:solidFill>
-                <a:latin typeface="Cambria"/>
-              </a:rPr>
-              <a:t>T</a:t>
-            </a:r>
-            <a:r>
-              <a:rPr b="1" lang="en-US" sz="800" spc="-1" strike="noStrike">
-                <a:solidFill>
-                  <a:srgbClr val="ff1493"/>
-                </a:solidFill>
-                <a:latin typeface="Cambria"/>
-              </a:rPr>
-              <a:t>o</a:t>
-            </a:r>
-            <a:r>
-              <a:rPr b="1" lang="en-US" sz="800" spc="-1" strike="noStrike">
-                <a:solidFill>
-                  <a:srgbClr val="ff1493"/>
-                </a:solidFill>
-                <a:latin typeface="Cambria"/>
-              </a:rPr>
-              <a:t>u</a:t>
-            </a:r>
-            <a:r>
-              <a:rPr b="1" lang="en-US" sz="800" spc="-1" strike="noStrike">
-                <a:solidFill>
-                  <a:srgbClr val="ff1493"/>
-                </a:solidFill>
-                <a:latin typeface="Cambria"/>
-              </a:rPr>
-              <a:t>r</a:t>
-            </a:r>
-            <a:r>
-              <a:rPr b="1" lang="en-US" sz="800" spc="-1" strike="noStrike">
-                <a:solidFill>
-                  <a:srgbClr val="ff1493"/>
-                </a:solidFill>
-                <a:latin typeface="Cambria"/>
-              </a:rPr>
-              <a:t>s</a:t>
-            </a:r>
-            <a:endParaRPr b="1" lang="en-US" sz="800" spc="-1" strike="noStrike">
-              <a:solidFill>
-                <a:srgbClr val="ff1493"/>
-              </a:solidFill>
-              <a:latin typeface="Cambria"/>
-            </a:endParaRPr>
-          </a:p>
-        </p:txBody>
-      </p:sp>
-      <p:sp>
-        <p:nvSpPr>
-          <p:cNvPr id="82" name="TextShape 30"/>
-          <p:cNvSpPr txBox="1"/>
-          <p:nvPr/>
-        </p:nvSpPr>
-        <p:spPr>
-          <a:xfrm>
-            <a:off x="3641040" y="6876720"/>
-            <a:ext cx="914400" cy="207720"/>
-          </a:xfrm>
-          <a:prstGeom prst="rect">
-            <a:avLst/>
-          </a:prstGeom>
-          <a:noFill/>
-          <a:ln>
-            <a:noFill/>
-          </a:ln>
-        </p:spPr>
-        <p:txBody>
-          <a:bodyPr lIns="90000" rIns="90000" tIns="45000" bIns="45000"/>
-          <a:p>
-            <a:r>
-              <a:rPr b="1" lang="en-US" sz="800" spc="-1" strike="noStrike">
-                <a:solidFill>
-                  <a:srgbClr val="000000"/>
-                </a:solidFill>
-                <a:latin typeface="Cambria"/>
-              </a:rPr>
-              <a:t>Hackathon</a:t>
-            </a:r>
-            <a:endParaRPr b="1" lang="en-US" sz="800" spc="-1" strike="noStrike">
-              <a:solidFill>
-                <a:srgbClr val="000000"/>
-              </a:solidFill>
-              <a:latin typeface="Cambria"/>
-            </a:endParaRPr>
-          </a:p>
-        </p:txBody>
-      </p:sp>
-      <p:sp>
-        <p:nvSpPr>
-          <p:cNvPr id="83" name="TextShape 31"/>
-          <p:cNvSpPr txBox="1"/>
-          <p:nvPr/>
-        </p:nvSpPr>
-        <p:spPr>
-          <a:xfrm>
-            <a:off x="3821040" y="7164360"/>
-            <a:ext cx="914400" cy="207720"/>
-          </a:xfrm>
-          <a:prstGeom prst="rect">
-            <a:avLst/>
-          </a:prstGeom>
-          <a:noFill/>
-          <a:ln>
-            <a:noFill/>
-          </a:ln>
-        </p:spPr>
-        <p:txBody>
-          <a:bodyPr lIns="90000" rIns="90000" tIns="45000" bIns="45000"/>
-          <a:p>
-            <a:r>
-              <a:rPr b="1" lang="en-US" sz="800" spc="-1" strike="noStrike">
-                <a:solidFill>
-                  <a:srgbClr val="2f5597"/>
-                </a:solidFill>
-                <a:latin typeface="Cambria"/>
-              </a:rPr>
-              <a:t>Training events</a:t>
-            </a:r>
-            <a:endParaRPr b="1" lang="en-US" sz="800" spc="-1" strike="noStrike">
-              <a:solidFill>
-                <a:srgbClr val="2f5597"/>
-              </a:solidFill>
-              <a:latin typeface="Cambria"/>
-            </a:endParaRPr>
-          </a:p>
-        </p:txBody>
-      </p:sp>
-      <p:sp>
-        <p:nvSpPr>
-          <p:cNvPr id="84" name="Line 32"/>
-          <p:cNvSpPr/>
-          <p:nvPr/>
-        </p:nvSpPr>
-        <p:spPr>
-          <a:xfrm flipH="1">
-            <a:off x="4897800" y="4804920"/>
-            <a:ext cx="577440" cy="1022400"/>
-          </a:xfrm>
-          <a:prstGeom prst="line">
-            <a:avLst/>
-          </a:prstGeom>
-          <a:ln w="10080">
-            <a:solidFill>
-              <a:srgbClr val="ff1493"/>
-            </a:solidFill>
-            <a:round/>
-          </a:ln>
-        </p:spPr>
         <p:style>
           <a:lnRef idx="0"/>
           <a:fillRef idx="0"/>
@@ -4465,25 +3839,46 @@
           <a:fontRef idx="minor"/>
         </p:style>
       </p:sp>
-      <p:sp>
-        <p:nvSpPr>
-          <p:cNvPr id="85" name="Line 33"/>
+      <p:pic>
+        <p:nvPicPr>
+          <p:cNvPr id="74" name="" descr=""/>
+          <p:cNvPicPr/>
+          <p:nvPr/>
+        </p:nvPicPr>
+        <p:blipFill>
+          <a:blip r:embed="rId11"/>
+          <a:stretch/>
+        </p:blipFill>
+        <p:spPr>
+          <a:xfrm>
+            <a:off x="4093200" y="4461120"/>
+            <a:ext cx="2067840" cy="2834280"/>
+          </a:xfrm>
+          <a:prstGeom prst="rect">
+            <a:avLst/>
+          </a:prstGeom>
+          <a:ln>
+            <a:noFill/>
+          </a:ln>
+        </p:spPr>
+      </p:pic>
+      <p:sp>
+        <p:nvSpPr>
+          <p:cNvPr id="75" name="CustomShape 23"/>
           <p:cNvSpPr/>
           <p:nvPr/>
         </p:nvSpPr>
         <p:spPr>
-          <a:xfrm flipH="1">
-            <a:off x="4506120" y="4823640"/>
-            <a:ext cx="968040" cy="2216520"/>
-          </a:xfrm>
-          <a:prstGeom prst="line">
-            <a:avLst/>
-          </a:prstGeom>
-          <a:ln w="10080">
-            <a:solidFill>
-              <a:srgbClr val="ff1493"/>
-            </a:solidFill>
-            <a:round/>
+          <a:xfrm>
+            <a:off x="5518080" y="5724000"/>
+            <a:ext cx="914040" cy="207360"/>
+          </a:xfrm>
+          <a:prstGeom prst="rect">
+            <a:avLst/>
+          </a:prstGeom>
+          <a:noFill/>
+          <a:ln>
+            <a:noFill/>
           </a:ln>
         </p:spPr>
         <p:style>
@@ -4492,26 +3887,41 @@
           <a:effectRef idx="0"/>
           <a:fontRef idx="minor"/>
         </p:style>
-      </p:sp>
-      <p:sp>
-        <p:nvSpPr>
-          <p:cNvPr id="86" name="Line 34"/>
+        <p:txBody>
+          <a:bodyPr lIns="90000" rIns="90000" tIns="45000" bIns="45000"/>
+          <a:p>
+            <a:r>
+              <a:rPr b="1" lang="en-US" sz="800" spc="-1" strike="noStrike">
+                <a:solidFill>
+                  <a:srgbClr val="2f5597"/>
+                </a:solidFill>
+                <a:latin typeface="Cambria"/>
+              </a:rPr>
+              <a:t>Training events</a:t>
+            </a:r>
+            <a:endParaRPr b="0" lang="en-US" sz="800" spc="-1" strike="noStrike">
+              <a:latin typeface="Arial"/>
+            </a:endParaRPr>
+          </a:p>
+        </p:txBody>
+      </p:sp>
+      <p:sp>
+        <p:nvSpPr>
+          <p:cNvPr id="76" name="CustomShape 24"/>
           <p:cNvSpPr/>
           <p:nvPr/>
         </p:nvSpPr>
         <p:spPr>
           <a:xfrm>
-            <a:off x="5479920" y="4807800"/>
-            <a:ext cx="78840" cy="1009080"/>
-          </a:xfrm>
-          <a:prstGeom prst="line">
-            <a:avLst/>
-          </a:prstGeom>
-          <a:ln w="10080">
-            <a:solidFill>
-              <a:srgbClr val="ff1493"/>
-            </a:solidFill>
-            <a:round/>
+            <a:off x="3605040" y="5652720"/>
+            <a:ext cx="1426680" cy="559440"/>
+          </a:xfrm>
+          <a:prstGeom prst="rect">
+            <a:avLst/>
+          </a:prstGeom>
+          <a:noFill/>
+          <a:ln>
+            <a:noFill/>
           </a:ln>
         </p:spPr>
         <p:style>
@@ -4520,17 +3930,48 @@
           <a:effectRef idx="0"/>
           <a:fontRef idx="minor"/>
         </p:style>
-      </p:sp>
-      <p:sp>
-        <p:nvSpPr>
-          <p:cNvPr id="87" name="TextShape 35"/>
-          <p:cNvSpPr txBox="1"/>
-          <p:nvPr/>
-        </p:nvSpPr>
-        <p:spPr>
-          <a:xfrm>
-            <a:off x="3873600" y="4389120"/>
-            <a:ext cx="848520" cy="207720"/>
+        <p:txBody>
+          <a:bodyPr lIns="90000" rIns="90000" tIns="45000" bIns="45000"/>
+          <a:p>
+            <a:r>
+              <a:rPr b="1" lang="en-US" sz="800" spc="-1" strike="noStrike">
+                <a:solidFill>
+                  <a:srgbClr val="ff1493"/>
+                </a:solidFill>
+                <a:latin typeface="Cambria"/>
+              </a:rPr>
+              <a:t>Galaxy Interactive</a:t>
+            </a:r>
+            <a:endParaRPr b="0" lang="en-US" sz="800" spc="-1" strike="noStrike">
+              <a:latin typeface="Arial"/>
+            </a:endParaRPr>
+          </a:p>
+          <a:p>
+            <a:r>
+              <a:rPr b="1" lang="en-US" sz="800" spc="-1" strike="noStrike">
+                <a:solidFill>
+                  <a:srgbClr val="ff1493"/>
+                </a:solidFill>
+                <a:latin typeface="Cambria"/>
+              </a:rPr>
+              <a:t>Recommendation system</a:t>
+            </a:r>
+            <a:endParaRPr b="0" lang="en-US" sz="800" spc="-1" strike="noStrike">
+              <a:latin typeface="Arial"/>
+            </a:endParaRPr>
+          </a:p>
+        </p:txBody>
+      </p:sp>
+      <p:sp>
+        <p:nvSpPr>
+          <p:cNvPr id="77" name="CustomShape 25"/>
+          <p:cNvSpPr/>
+          <p:nvPr/>
+        </p:nvSpPr>
+        <p:spPr>
+          <a:xfrm>
+            <a:off x="4829040" y="4572720"/>
+            <a:ext cx="914040" cy="207360"/>
           </a:xfrm>
           <a:prstGeom prst="rect">
             <a:avLst/>
@@ -4540,17 +3981,408 @@
             <a:noFill/>
           </a:ln>
         </p:spPr>
+        <p:style>
+          <a:lnRef idx="0"/>
+          <a:fillRef idx="0"/>
+          <a:effectRef idx="0"/>
+          <a:fontRef idx="minor"/>
+        </p:style>
         <p:txBody>
           <a:bodyPr lIns="90000" rIns="90000" tIns="45000" bIns="45000"/>
           <a:p>
             <a:r>
               <a:rPr b="1" lang="en-US" sz="800" spc="-1" strike="noStrike">
+                <a:solidFill>
+                  <a:srgbClr val="ff1493"/>
+                </a:solidFill>
+                <a:latin typeface="Cambria"/>
+              </a:rPr>
+              <a:t>Galaxy Tours</a:t>
+            </a:r>
+            <a:endParaRPr b="0" lang="en-US" sz="800" spc="-1" strike="noStrike">
+              <a:latin typeface="Arial"/>
+            </a:endParaRPr>
+          </a:p>
+        </p:txBody>
+      </p:sp>
+      <p:sp>
+        <p:nvSpPr>
+          <p:cNvPr id="78" name="CustomShape 26"/>
+          <p:cNvSpPr/>
+          <p:nvPr/>
+        </p:nvSpPr>
+        <p:spPr>
+          <a:xfrm>
+            <a:off x="3713040" y="5904360"/>
+            <a:ext cx="914040" cy="207360"/>
+          </a:xfrm>
+          <a:prstGeom prst="rect">
+            <a:avLst/>
+          </a:prstGeom>
+          <a:noFill/>
+          <a:ln>
+            <a:noFill/>
+          </a:ln>
+        </p:spPr>
+        <p:style>
+          <a:lnRef idx="0"/>
+          <a:fillRef idx="0"/>
+          <a:effectRef idx="0"/>
+          <a:fontRef idx="minor"/>
+        </p:style>
+        <p:txBody>
+          <a:bodyPr lIns="90000" rIns="90000" tIns="45000" bIns="45000"/>
+          <a:p>
+            <a:r>
+              <a:rPr b="1" lang="en-US" sz="800" spc="-1" strike="noStrike">
+                <a:solidFill>
+                  <a:srgbClr val="000000"/>
+                </a:solidFill>
+                <a:latin typeface="Cambria"/>
+              </a:rPr>
+              <a:t>Hackathon</a:t>
+            </a:r>
+            <a:endParaRPr b="0" lang="en-US" sz="800" spc="-1" strike="noStrike">
+              <a:latin typeface="Arial"/>
+            </a:endParaRPr>
+          </a:p>
+        </p:txBody>
+      </p:sp>
+      <p:sp>
+        <p:nvSpPr>
+          <p:cNvPr id="79" name="CustomShape 27"/>
+          <p:cNvSpPr/>
+          <p:nvPr/>
+        </p:nvSpPr>
+        <p:spPr>
+          <a:xfrm>
+            <a:off x="4937040" y="4464360"/>
+            <a:ext cx="914040" cy="207360"/>
+          </a:xfrm>
+          <a:prstGeom prst="rect">
+            <a:avLst/>
+          </a:prstGeom>
+          <a:noFill/>
+          <a:ln>
+            <a:noFill/>
+          </a:ln>
+        </p:spPr>
+        <p:style>
+          <a:lnRef idx="0"/>
+          <a:fillRef idx="0"/>
+          <a:effectRef idx="0"/>
+          <a:fontRef idx="minor"/>
+        </p:style>
+        <p:txBody>
+          <a:bodyPr lIns="90000" rIns="90000" tIns="45000" bIns="45000"/>
+          <a:p>
+            <a:r>
+              <a:rPr b="1" lang="en-US" sz="800" spc="-1" strike="noStrike">
+                <a:solidFill>
+                  <a:srgbClr val="2f5597"/>
+                </a:solidFill>
+                <a:latin typeface="Cambria"/>
+              </a:rPr>
+              <a:t>Training events</a:t>
+            </a:r>
+            <a:endParaRPr b="0" lang="en-US" sz="800" spc="-1" strike="noStrike">
+              <a:latin typeface="Arial"/>
+            </a:endParaRPr>
+          </a:p>
+        </p:txBody>
+      </p:sp>
+      <p:sp>
+        <p:nvSpPr>
+          <p:cNvPr id="80" name="CustomShape 28"/>
+          <p:cNvSpPr/>
+          <p:nvPr/>
+        </p:nvSpPr>
+        <p:spPr>
+          <a:xfrm>
+            <a:off x="5621040" y="5869080"/>
+            <a:ext cx="914040" cy="207360"/>
+          </a:xfrm>
+          <a:prstGeom prst="rect">
+            <a:avLst/>
+          </a:prstGeom>
+          <a:noFill/>
+          <a:ln>
+            <a:noFill/>
+          </a:ln>
+        </p:spPr>
+        <p:style>
+          <a:lnRef idx="0"/>
+          <a:fillRef idx="0"/>
+          <a:effectRef idx="0"/>
+          <a:fontRef idx="minor"/>
+        </p:style>
+        <p:txBody>
+          <a:bodyPr lIns="90000" rIns="90000" tIns="45000" bIns="45000"/>
+          <a:p>
+            <a:r>
+              <a:rPr b="1" lang="en-US" sz="800" spc="-1" strike="noStrike">
+                <a:solidFill>
+                  <a:srgbClr val="ff1493"/>
+                </a:solidFill>
+                <a:latin typeface="Cambria"/>
+              </a:rPr>
+              <a:t>Galaxy Flavor</a:t>
+            </a:r>
+            <a:endParaRPr b="0" lang="en-US" sz="800" spc="-1" strike="noStrike">
+              <a:latin typeface="Arial"/>
+            </a:endParaRPr>
+          </a:p>
+        </p:txBody>
+      </p:sp>
+      <p:sp>
+        <p:nvSpPr>
+          <p:cNvPr id="81" name="CustomShape 29"/>
+          <p:cNvSpPr/>
+          <p:nvPr/>
+        </p:nvSpPr>
+        <p:spPr>
+          <a:xfrm>
+            <a:off x="3713040" y="7021080"/>
+            <a:ext cx="914040" cy="207360"/>
+          </a:xfrm>
+          <a:prstGeom prst="rect">
+            <a:avLst/>
+          </a:prstGeom>
+          <a:noFill/>
+          <a:ln>
+            <a:noFill/>
+          </a:ln>
+        </p:spPr>
+        <p:style>
+          <a:lnRef idx="0"/>
+          <a:fillRef idx="0"/>
+          <a:effectRef idx="0"/>
+          <a:fontRef idx="minor"/>
+        </p:style>
+        <p:txBody>
+          <a:bodyPr lIns="90000" rIns="90000" tIns="45000" bIns="45000"/>
+          <a:p>
+            <a:r>
+              <a:rPr b="1" lang="en-US" sz="800" spc="-1" strike="noStrike">
+                <a:solidFill>
+                  <a:srgbClr val="ff1493"/>
+                </a:solidFill>
+                <a:latin typeface="Cambria"/>
+              </a:rPr>
+              <a:t>Galaxy Tours</a:t>
+            </a:r>
+            <a:endParaRPr b="0" lang="en-US" sz="800" spc="-1" strike="noStrike">
+              <a:latin typeface="Arial"/>
+            </a:endParaRPr>
+          </a:p>
+        </p:txBody>
+      </p:sp>
+      <p:sp>
+        <p:nvSpPr>
+          <p:cNvPr id="82" name="CustomShape 30"/>
+          <p:cNvSpPr/>
+          <p:nvPr/>
+        </p:nvSpPr>
+        <p:spPr>
+          <a:xfrm>
+            <a:off x="3641040" y="6876720"/>
+            <a:ext cx="914040" cy="207360"/>
+          </a:xfrm>
+          <a:prstGeom prst="rect">
+            <a:avLst/>
+          </a:prstGeom>
+          <a:noFill/>
+          <a:ln>
+            <a:noFill/>
+          </a:ln>
+        </p:spPr>
+        <p:style>
+          <a:lnRef idx="0"/>
+          <a:fillRef idx="0"/>
+          <a:effectRef idx="0"/>
+          <a:fontRef idx="minor"/>
+        </p:style>
+        <p:txBody>
+          <a:bodyPr lIns="90000" rIns="90000" tIns="45000" bIns="45000"/>
+          <a:p>
+            <a:r>
+              <a:rPr b="1" lang="en-US" sz="800" spc="-1" strike="noStrike">
+                <a:solidFill>
+                  <a:srgbClr val="000000"/>
+                </a:solidFill>
+                <a:latin typeface="Cambria"/>
+              </a:rPr>
+              <a:t>Hackathon</a:t>
+            </a:r>
+            <a:endParaRPr b="0" lang="en-US" sz="800" spc="-1" strike="noStrike">
+              <a:latin typeface="Arial"/>
+            </a:endParaRPr>
+          </a:p>
+        </p:txBody>
+      </p:sp>
+      <p:sp>
+        <p:nvSpPr>
+          <p:cNvPr id="83" name="CustomShape 31"/>
+          <p:cNvSpPr/>
+          <p:nvPr/>
+        </p:nvSpPr>
+        <p:spPr>
+          <a:xfrm>
+            <a:off x="3821040" y="7164360"/>
+            <a:ext cx="914040" cy="207360"/>
+          </a:xfrm>
+          <a:prstGeom prst="rect">
+            <a:avLst/>
+          </a:prstGeom>
+          <a:noFill/>
+          <a:ln>
+            <a:noFill/>
+          </a:ln>
+        </p:spPr>
+        <p:style>
+          <a:lnRef idx="0"/>
+          <a:fillRef idx="0"/>
+          <a:effectRef idx="0"/>
+          <a:fontRef idx="minor"/>
+        </p:style>
+        <p:txBody>
+          <a:bodyPr lIns="90000" rIns="90000" tIns="45000" bIns="45000"/>
+          <a:p>
+            <a:r>
+              <a:rPr b="1" lang="en-US" sz="800" spc="-1" strike="noStrike">
+                <a:solidFill>
+                  <a:srgbClr val="2f5597"/>
+                </a:solidFill>
+                <a:latin typeface="Cambria"/>
+              </a:rPr>
+              <a:t>Training events</a:t>
+            </a:r>
+            <a:endParaRPr b="0" lang="en-US" sz="800" spc="-1" strike="noStrike">
+              <a:latin typeface="Arial"/>
+            </a:endParaRPr>
+          </a:p>
+        </p:txBody>
+      </p:sp>
+      <p:sp>
+        <p:nvSpPr>
+          <p:cNvPr id="84" name="Line 32"/>
+          <p:cNvSpPr/>
+          <p:nvPr/>
+        </p:nvSpPr>
+        <p:spPr>
+          <a:xfrm flipH="1">
+            <a:off x="4897800" y="4804920"/>
+            <a:ext cx="577440" cy="1022400"/>
+          </a:xfrm>
+          <a:prstGeom prst="line">
+            <a:avLst/>
+          </a:prstGeom>
+          <a:ln w="10080">
+            <a:solidFill>
+              <a:srgbClr val="ff1493"/>
+            </a:solidFill>
+            <a:round/>
+          </a:ln>
+        </p:spPr>
+        <p:style>
+          <a:lnRef idx="0"/>
+          <a:fillRef idx="0"/>
+          <a:effectRef idx="0"/>
+          <a:fontRef idx="minor"/>
+        </p:style>
+      </p:sp>
+      <p:sp>
+        <p:nvSpPr>
+          <p:cNvPr id="85" name="Line 33"/>
+          <p:cNvSpPr/>
+          <p:nvPr/>
+        </p:nvSpPr>
+        <p:spPr>
+          <a:xfrm flipH="1">
+            <a:off x="4506120" y="4823640"/>
+            <a:ext cx="968040" cy="2216520"/>
+          </a:xfrm>
+          <a:prstGeom prst="line">
+            <a:avLst/>
+          </a:prstGeom>
+          <a:ln w="10080">
+            <a:solidFill>
+              <a:srgbClr val="ff1493"/>
+            </a:solidFill>
+            <a:round/>
+          </a:ln>
+        </p:spPr>
+        <p:style>
+          <a:lnRef idx="0"/>
+          <a:fillRef idx="0"/>
+          <a:effectRef idx="0"/>
+          <a:fontRef idx="minor"/>
+        </p:style>
+      </p:sp>
+      <p:sp>
+        <p:nvSpPr>
+          <p:cNvPr id="86" name="Line 34"/>
+          <p:cNvSpPr/>
+          <p:nvPr/>
+        </p:nvSpPr>
+        <p:spPr>
+          <a:xfrm>
+            <a:off x="5479920" y="4807800"/>
+            <a:ext cx="78840" cy="1009080"/>
+          </a:xfrm>
+          <a:prstGeom prst="line">
+            <a:avLst/>
+          </a:prstGeom>
+          <a:ln w="10080">
+            <a:solidFill>
+              <a:srgbClr val="ff1493"/>
+            </a:solidFill>
+            <a:round/>
+          </a:ln>
+        </p:spPr>
+        <p:style>
+          <a:lnRef idx="0"/>
+          <a:fillRef idx="0"/>
+          <a:effectRef idx="0"/>
+          <a:fontRef idx="minor"/>
+        </p:style>
+      </p:sp>
+      <p:sp>
+        <p:nvSpPr>
+          <p:cNvPr id="87" name="CustomShape 35"/>
+          <p:cNvSpPr/>
+          <p:nvPr/>
+        </p:nvSpPr>
+        <p:spPr>
+          <a:xfrm>
+            <a:off x="3873600" y="4389120"/>
+            <a:ext cx="848160" cy="207360"/>
+          </a:xfrm>
+          <a:prstGeom prst="rect">
+            <a:avLst/>
+          </a:prstGeom>
+          <a:noFill/>
+          <a:ln>
+            <a:noFill/>
+          </a:ln>
+        </p:spPr>
+        <p:style>
+          <a:lnRef idx="0"/>
+          <a:fillRef idx="0"/>
+          <a:effectRef idx="0"/>
+          <a:fontRef idx="minor"/>
+        </p:style>
+        <p:txBody>
+          <a:bodyPr lIns="90000" rIns="90000" tIns="45000" bIns="45000"/>
+          <a:p>
+            <a:r>
+              <a:rPr b="1" lang="en-US" sz="800" spc="-1" strike="noStrike">
                 <a:latin typeface="Cambria"/>
               </a:rPr>
               <a:t>destairdenbi</a:t>
             </a:r>
-            <a:endParaRPr b="1" lang="en-US" sz="800" spc="-1" strike="noStrike">
-              <a:latin typeface="Cambria"/>
+            <a:endParaRPr b="0" lang="en-US" sz="800" spc="-1" strike="noStrike">
+              <a:latin typeface="Arial"/>
             </a:endParaRPr>
           </a:p>
         </p:txBody>
@@ -4568,7 +4400,7 @@
         <p:spPr>
           <a:xfrm>
             <a:off x="3644640" y="4349520"/>
-            <a:ext cx="275040" cy="275040"/>
+            <a:ext cx="274680" cy="274680"/>
           </a:xfrm>
           <a:prstGeom prst="rect">
             <a:avLst/>
@@ -4580,14 +4412,14 @@
       </p:pic>
       <p:sp>
         <p:nvSpPr>
-          <p:cNvPr id="89" name="TextShape 36"/>
-          <p:cNvSpPr txBox="1"/>
+          <p:cNvPr id="89" name="CustomShape 36"/>
+          <p:cNvSpPr/>
           <p:nvPr/>
         </p:nvSpPr>
         <p:spPr>
           <a:xfrm>
             <a:off x="5832720" y="2563200"/>
-            <a:ext cx="822960" cy="182880"/>
+            <a:ext cx="822600" cy="182520"/>
           </a:xfrm>
           <a:prstGeom prst="rect">
             <a:avLst/>
@@ -4597,10 +4429,20 @@
             <a:noFill/>
           </a:ln>
         </p:spPr>
+        <p:style>
+          <a:lnRef idx="0"/>
+          <a:fillRef idx="0"/>
+          <a:effectRef idx="0"/>
+          <a:fontRef idx="minor"/>
+        </p:style>
         <p:txBody>
           <a:bodyPr lIns="90000" rIns="90000" tIns="45000" bIns="45000"/>
           <a:p>
-            <a:pPr algn="ctr"/>
+            <a:pPr algn="ctr">
+              <a:lnSpc>
+                <a:spcPct val="100000"/>
+              </a:lnSpc>
+            </a:pPr>
             <a:r>
               <a:rPr b="0" lang="en-US" sz="600" spc="-1" strike="noStrike">
                 <a:solidFill>
@@ -4611,24 +4453,21 @@
               <a:t>galaxyproject.org</a:t>
             </a:r>
             <a:endParaRPr b="0" lang="en-US" sz="600" spc="-1" strike="noStrike">
-              <a:solidFill>
-                <a:srgbClr val="00bfff"/>
-              </a:solidFill>
-              <a:latin typeface="Cambria"/>
-            </a:endParaRPr>
-          </a:p>
-        </p:txBody>
-      </p:sp>
-      <p:sp>
-        <p:nvSpPr>
-          <p:cNvPr id="90" name="TextShape 37"/>
-          <p:cNvSpPr txBox="1"/>
+              <a:latin typeface="Arial"/>
+            </a:endParaRPr>
+          </a:p>
+        </p:txBody>
+      </p:sp>
+      <p:sp>
+        <p:nvSpPr>
+          <p:cNvPr id="90" name="CustomShape 37"/>
+          <p:cNvSpPr/>
           <p:nvPr/>
         </p:nvSpPr>
         <p:spPr>
           <a:xfrm>
             <a:off x="5832720" y="3355200"/>
-            <a:ext cx="822960" cy="182880"/>
+            <a:ext cx="822600" cy="182520"/>
           </a:xfrm>
           <a:prstGeom prst="rect">
             <a:avLst/>
@@ -4638,10 +4477,20 @@
             <a:noFill/>
           </a:ln>
         </p:spPr>
+        <p:style>
+          <a:lnRef idx="0"/>
+          <a:fillRef idx="0"/>
+          <a:effectRef idx="0"/>
+          <a:fontRef idx="minor"/>
+        </p:style>
         <p:txBody>
           <a:bodyPr lIns="90000" rIns="90000" tIns="45000" bIns="45000"/>
           <a:p>
-            <a:pPr algn="ctr"/>
+            <a:pPr algn="ctr">
+              <a:lnSpc>
+                <a:spcPct val="100000"/>
+              </a:lnSpc>
+            </a:pPr>
             <a:r>
               <a:rPr b="0" lang="en-US" sz="600" spc="-1" strike="noStrike">
                 <a:solidFill>
@@ -4652,24 +4501,21 @@
               <a:t>edamontology.org</a:t>
             </a:r>
             <a:endParaRPr b="0" lang="en-US" sz="600" spc="-1" strike="noStrike">
-              <a:solidFill>
-                <a:srgbClr val="00bfff"/>
-              </a:solidFill>
-              <a:latin typeface="Cambria"/>
-            </a:endParaRPr>
-          </a:p>
-        </p:txBody>
-      </p:sp>
-      <p:sp>
-        <p:nvSpPr>
-          <p:cNvPr id="91" name="TextShape 38"/>
-          <p:cNvSpPr txBox="1"/>
+              <a:latin typeface="Arial"/>
+            </a:endParaRPr>
+          </a:p>
+        </p:txBody>
+      </p:sp>
+      <p:sp>
+        <p:nvSpPr>
+          <p:cNvPr id="91" name="CustomShape 38"/>
+          <p:cNvSpPr/>
           <p:nvPr/>
         </p:nvSpPr>
         <p:spPr>
           <a:xfrm>
             <a:off x="5832720" y="4147200"/>
-            <a:ext cx="822960" cy="182880"/>
+            <a:ext cx="822600" cy="182520"/>
           </a:xfrm>
           <a:prstGeom prst="rect">
             <a:avLst/>
@@ -4679,10 +4525,20 @@
             <a:noFill/>
           </a:ln>
         </p:spPr>
+        <p:style>
+          <a:lnRef idx="0"/>
+          <a:fillRef idx="0"/>
+          <a:effectRef idx="0"/>
+          <a:fontRef idx="minor"/>
+        </p:style>
         <p:txBody>
           <a:bodyPr lIns="90000" rIns="90000" tIns="45000" bIns="45000"/>
           <a:p>
-            <a:pPr algn="ctr"/>
+            <a:pPr algn="ctr">
+              <a:lnSpc>
+                <a:spcPct val="100000"/>
+              </a:lnSpc>
+            </a:pPr>
             <a:r>
               <a:rPr b="0" lang="en-US" sz="600" spc="-1" strike="noStrike">
                 <a:solidFill>
@@ -4693,10 +4549,7 @@
               <a:t>denbi.de/rbc</a:t>
             </a:r>
             <a:endParaRPr b="0" lang="en-US" sz="600" spc="-1" strike="noStrike">
-              <a:solidFill>
-                <a:srgbClr val="00bfff"/>
-              </a:solidFill>
-              <a:latin typeface="Cambria"/>
+              <a:latin typeface="Arial"/>
             </a:endParaRPr>
           </a:p>
         </p:txBody>
@@ -4714,7 +4567,7 @@
         <p:spPr>
           <a:xfrm>
             <a:off x="5419440" y="9363600"/>
-            <a:ext cx="582480" cy="403920"/>
+            <a:ext cx="582120" cy="403560"/>
           </a:xfrm>
           <a:prstGeom prst="rect">
             <a:avLst/>
@@ -4737,7 +4590,7 @@
         <p:spPr>
           <a:xfrm>
             <a:off x="6070680" y="9358200"/>
-            <a:ext cx="625320" cy="416880"/>
+            <a:ext cx="624960" cy="416520"/>
           </a:xfrm>
           <a:prstGeom prst="rect">
             <a:avLst/>
@@ -4760,7 +4613,7 @@
         <p:spPr>
           <a:xfrm>
             <a:off x="5869080" y="7040880"/>
-            <a:ext cx="695160" cy="182880"/>
+            <a:ext cx="694800" cy="182520"/>
           </a:xfrm>
           <a:prstGeom prst="rect">
             <a:avLst/>
@@ -4772,14 +4625,14 @@
       </p:pic>
       <p:sp>
         <p:nvSpPr>
-          <p:cNvPr id="95" name="TextShape 39"/>
-          <p:cNvSpPr txBox="1"/>
+          <p:cNvPr id="95" name="CustomShape 39"/>
+          <p:cNvSpPr/>
           <p:nvPr/>
         </p:nvSpPr>
         <p:spPr>
           <a:xfrm>
             <a:off x="5832720" y="7207200"/>
-            <a:ext cx="822960" cy="182880"/>
+            <a:ext cx="822600" cy="182520"/>
           </a:xfrm>
           <a:prstGeom prst="rect">
             <a:avLst/>
@@ -4789,10 +4642,20 @@
             <a:noFill/>
           </a:ln>
         </p:spPr>
+        <p:style>
+          <a:lnRef idx="0"/>
+          <a:fillRef idx="0"/>
+          <a:effectRef idx="0"/>
+          <a:fontRef idx="minor"/>
+        </p:style>
         <p:txBody>
           <a:bodyPr lIns="90000" rIns="90000" tIns="45000" bIns="45000"/>
           <a:p>
-            <a:pPr algn="ctr"/>
+            <a:pPr algn="ctr">
+              <a:lnSpc>
+                <a:spcPct val="100000"/>
+              </a:lnSpc>
+            </a:pPr>
             <a:r>
               <a:rPr b="0" lang="en-US" sz="600" spc="-1" strike="noStrike">
                 <a:solidFill>
@@ -4803,24 +4666,21 @@
               <a:t>denbi.de</a:t>
             </a:r>
             <a:endParaRPr b="0" lang="en-US" sz="600" spc="-1" strike="noStrike">
-              <a:solidFill>
-                <a:srgbClr val="00bfff"/>
-              </a:solidFill>
-              <a:latin typeface="Cambria"/>
-            </a:endParaRPr>
-          </a:p>
-        </p:txBody>
-      </p:sp>
-      <p:sp>
-        <p:nvSpPr>
-          <p:cNvPr id="96" name="TextShape 40"/>
-          <p:cNvSpPr txBox="1"/>
+              <a:latin typeface="Arial"/>
+            </a:endParaRPr>
+          </a:p>
+        </p:txBody>
+      </p:sp>
+      <p:sp>
+        <p:nvSpPr>
+          <p:cNvPr id="96" name="CustomShape 40"/>
+          <p:cNvSpPr/>
           <p:nvPr/>
         </p:nvSpPr>
         <p:spPr>
           <a:xfrm>
             <a:off x="3600720" y="4615200"/>
-            <a:ext cx="1082160" cy="267480"/>
+            <a:ext cx="1081800" cy="267120"/>
           </a:xfrm>
           <a:prstGeom prst="rect">
             <a:avLst/>
@@ -4830,10 +4690,20 @@
             <a:noFill/>
           </a:ln>
         </p:spPr>
+        <p:style>
+          <a:lnRef idx="0"/>
+          <a:fillRef idx="0"/>
+          <a:effectRef idx="0"/>
+          <a:fontRef idx="minor"/>
+        </p:style>
         <p:txBody>
           <a:bodyPr lIns="90000" rIns="90000" tIns="45000" bIns="45000"/>
           <a:p>
-            <a:pPr algn="ctr"/>
+            <a:pPr algn="ctr">
+              <a:lnSpc>
+                <a:spcPct val="100000"/>
+              </a:lnSpc>
+            </a:pPr>
             <a:r>
               <a:rPr b="0" lang="en-US" sz="600" spc="-1" strike="noStrike">
                 <a:solidFill>
@@ -4841,58 +4711,10 @@
                 </a:solidFill>
                 <a:latin typeface="Cambria"/>
               </a:rPr>
-              <a:t>desta</a:t>
-            </a:r>
-            <a:r>
-              <a:rPr b="0" lang="en-US" sz="600" spc="-1" strike="noStrike">
-                <a:solidFill>
-                  <a:srgbClr val="00bfff"/>
-                </a:solidFill>
-                <a:latin typeface="Cambria"/>
-              </a:rPr>
-              <a:t>ir.bioi</a:t>
-            </a:r>
-            <a:r>
-              <a:rPr b="0" lang="en-US" sz="600" spc="-1" strike="noStrike">
-                <a:solidFill>
-                  <a:srgbClr val="00bfff"/>
-                </a:solidFill>
-                <a:latin typeface="Cambria"/>
-              </a:rPr>
-              <a:t>nf.uni</a:t>
-            </a:r>
-            <a:r>
-              <a:rPr b="0" lang="en-US" sz="600" spc="-1" strike="noStrike">
-                <a:solidFill>
-                  <a:srgbClr val="00bfff"/>
-                </a:solidFill>
-                <a:latin typeface="Cambria"/>
-              </a:rPr>
-              <a:t>-</a:t>
-            </a:r>
-            <a:r>
-              <a:rPr b="0" lang="en-US" sz="600" spc="-1" strike="noStrike">
-                <a:solidFill>
-                  <a:srgbClr val="00bfff"/>
-                </a:solidFill>
-                <a:latin typeface="Cambria"/>
-              </a:rPr>
-              <a:t>leipzi</a:t>
-            </a:r>
-            <a:r>
-              <a:rPr b="0" lang="en-US" sz="600" spc="-1" strike="noStrike">
-                <a:solidFill>
-                  <a:srgbClr val="00bfff"/>
-                </a:solidFill>
-                <a:latin typeface="Cambria"/>
-              </a:rPr>
-              <a:t>g.de</a:t>
+              <a:t>destair.bioinf.uni-leipzig.de</a:t>
             </a:r>
             <a:endParaRPr b="0" lang="en-US" sz="600" spc="-1" strike="noStrike">
-              <a:solidFill>
-                <a:srgbClr val="00bfff"/>
-              </a:solidFill>
-              <a:latin typeface="Cambria"/>
+              <a:latin typeface="Arial"/>
             </a:endParaRPr>
           </a:p>
         </p:txBody>

</xml_diff>

<commit_message>
deleted periods at the end of the last dotted list
</commit_message>
<xml_diff>
--- a/2017-10-23__bielefeld__de.nbi_symposium/poster.pptx
+++ b/2017-10-23__bielefeld__de.nbi_symposium/poster.pptx
@@ -192,7 +192,7 @@
           <a:bodyPr lIns="0" rIns="0" tIns="0" bIns="0" anchor="b"/>
           <a:p>
             <a:pPr algn="r"/>
-            <a:fld id="{6CA38455-BE46-4038-B848-3CA845E5EE6C}" type="slidenum">
+            <a:fld id="{0BE34F92-2CBA-463E-B777-807F2276C33D}" type="slidenum">
               <a:rPr b="0" lang="en-US" sz="1400" spc="-1" strike="noStrike">
                 <a:latin typeface="Times New Roman"/>
               </a:rPr>
@@ -240,7 +240,7 @@
         <p:spPr>
           <a:xfrm>
             <a:off x="679320" y="4704840"/>
-            <a:ext cx="5435280" cy="4456440"/>
+            <a:ext cx="5434920" cy="4456080"/>
           </a:xfrm>
           <a:prstGeom prst="rect">
             <a:avLst/>
@@ -266,7 +266,7 @@
         <p:spPr>
           <a:xfrm>
             <a:off x="3848400" y="9409680"/>
-            <a:ext cx="2943360" cy="493560"/>
+            <a:ext cx="2943000" cy="493200"/>
           </a:xfrm>
           <a:prstGeom prst="rect">
             <a:avLst/>
@@ -340,7 +340,7 @@
         <p:spPr>
           <a:xfrm>
             <a:off x="342720" y="394920"/>
-            <a:ext cx="6171120" cy="1653120"/>
+            <a:ext cx="6171840" cy="1653840"/>
           </a:xfrm>
           <a:prstGeom prst="rect">
             <a:avLst/>
@@ -369,7 +369,7 @@
         <p:spPr>
           <a:xfrm>
             <a:off x="342720" y="2317680"/>
-            <a:ext cx="6171480" cy="2739960"/>
+            <a:ext cx="6171840" cy="2739960"/>
           </a:xfrm>
           <a:prstGeom prst="rect">
             <a:avLst/>
@@ -399,7 +399,7 @@
         <p:spPr>
           <a:xfrm>
             <a:off x="342720" y="5318280"/>
-            <a:ext cx="6171480" cy="2739960"/>
+            <a:ext cx="6171840" cy="2739960"/>
           </a:xfrm>
           <a:prstGeom prst="rect">
             <a:avLst/>
@@ -451,7 +451,7 @@
         <p:spPr>
           <a:xfrm>
             <a:off x="342720" y="394920"/>
-            <a:ext cx="6171120" cy="1653120"/>
+            <a:ext cx="6171840" cy="1653840"/>
           </a:xfrm>
           <a:prstGeom prst="rect">
             <a:avLst/>
@@ -480,7 +480,7 @@
         <p:spPr>
           <a:xfrm>
             <a:off x="342720" y="2317680"/>
-            <a:ext cx="3011400" cy="2739960"/>
+            <a:ext cx="3011760" cy="2739960"/>
           </a:xfrm>
           <a:prstGeom prst="rect">
             <a:avLst/>
@@ -509,8 +509,8 @@
         </p:nvSpPr>
         <p:spPr>
           <a:xfrm>
-            <a:off x="3504960" y="2317680"/>
-            <a:ext cx="3011400" cy="2739960"/>
+            <a:off x="3505320" y="2317680"/>
+            <a:ext cx="3011760" cy="2739960"/>
           </a:xfrm>
           <a:prstGeom prst="rect">
             <a:avLst/>
@@ -539,8 +539,8 @@
         </p:nvSpPr>
         <p:spPr>
           <a:xfrm>
-            <a:off x="3504960" y="5318280"/>
-            <a:ext cx="3011400" cy="2739960"/>
+            <a:off x="3505320" y="5318280"/>
+            <a:ext cx="3011760" cy="2739960"/>
           </a:xfrm>
           <a:prstGeom prst="rect">
             <a:avLst/>
@@ -570,7 +570,7 @@
         <p:spPr>
           <a:xfrm>
             <a:off x="342720" y="5318280"/>
-            <a:ext cx="3011400" cy="2739960"/>
+            <a:ext cx="3011760" cy="2739960"/>
           </a:xfrm>
           <a:prstGeom prst="rect">
             <a:avLst/>
@@ -622,7 +622,7 @@
         <p:spPr>
           <a:xfrm>
             <a:off x="342720" y="394920"/>
-            <a:ext cx="6171120" cy="1653120"/>
+            <a:ext cx="6171840" cy="1653840"/>
           </a:xfrm>
           <a:prstGeom prst="rect">
             <a:avLst/>
@@ -651,7 +651,7 @@
         <p:spPr>
           <a:xfrm>
             <a:off x="342720" y="2317680"/>
-            <a:ext cx="1986840" cy="2739960"/>
+            <a:ext cx="1987200" cy="2739960"/>
           </a:xfrm>
           <a:prstGeom prst="rect">
             <a:avLst/>
@@ -680,8 +680,8 @@
         </p:nvSpPr>
         <p:spPr>
           <a:xfrm>
-            <a:off x="2429280" y="2317680"/>
-            <a:ext cx="1986840" cy="2739960"/>
+            <a:off x="2429640" y="2317680"/>
+            <a:ext cx="1987200" cy="2739960"/>
           </a:xfrm>
           <a:prstGeom prst="rect">
             <a:avLst/>
@@ -710,8 +710,8 @@
         </p:nvSpPr>
         <p:spPr>
           <a:xfrm>
-            <a:off x="4515840" y="2317680"/>
-            <a:ext cx="1986840" cy="2739960"/>
+            <a:off x="4516560" y="2317680"/>
+            <a:ext cx="1987200" cy="2739960"/>
           </a:xfrm>
           <a:prstGeom prst="rect">
             <a:avLst/>
@@ -740,8 +740,8 @@
         </p:nvSpPr>
         <p:spPr>
           <a:xfrm>
-            <a:off x="4515840" y="5318280"/>
-            <a:ext cx="1986840" cy="2739960"/>
+            <a:off x="4516560" y="5318280"/>
+            <a:ext cx="1987200" cy="2739960"/>
           </a:xfrm>
           <a:prstGeom prst="rect">
             <a:avLst/>
@@ -770,8 +770,8 @@
         </p:nvSpPr>
         <p:spPr>
           <a:xfrm>
-            <a:off x="2429280" y="5318280"/>
-            <a:ext cx="1986840" cy="2739960"/>
+            <a:off x="2429640" y="5318280"/>
+            <a:ext cx="1987200" cy="2739960"/>
           </a:xfrm>
           <a:prstGeom prst="rect">
             <a:avLst/>
@@ -801,7 +801,7 @@
         <p:spPr>
           <a:xfrm>
             <a:off x="342720" y="5318280"/>
-            <a:ext cx="1986840" cy="2739960"/>
+            <a:ext cx="1987200" cy="2739960"/>
           </a:xfrm>
           <a:prstGeom prst="rect">
             <a:avLst/>
@@ -853,7 +853,7 @@
         <p:spPr>
           <a:xfrm>
             <a:off x="342720" y="394920"/>
-            <a:ext cx="6171120" cy="1653120"/>
+            <a:ext cx="6171840" cy="1653840"/>
           </a:xfrm>
           <a:prstGeom prst="rect">
             <a:avLst/>
@@ -882,7 +882,7 @@
         <p:spPr>
           <a:xfrm>
             <a:off x="342720" y="2317680"/>
-            <a:ext cx="6171480" cy="5744520"/>
+            <a:ext cx="6171840" cy="5744880"/>
           </a:xfrm>
           <a:prstGeom prst="rect">
             <a:avLst/>
@@ -933,7 +933,7 @@
         <p:spPr>
           <a:xfrm>
             <a:off x="342720" y="394920"/>
-            <a:ext cx="6171120" cy="1653120"/>
+            <a:ext cx="6171840" cy="1653840"/>
           </a:xfrm>
           <a:prstGeom prst="rect">
             <a:avLst/>
@@ -962,7 +962,7 @@
         <p:spPr>
           <a:xfrm>
             <a:off x="342720" y="2317680"/>
-            <a:ext cx="6171480" cy="5744520"/>
+            <a:ext cx="6171840" cy="5744880"/>
           </a:xfrm>
           <a:prstGeom prst="rect">
             <a:avLst/>
@@ -1014,7 +1014,7 @@
         <p:spPr>
           <a:xfrm>
             <a:off x="342720" y="394920"/>
-            <a:ext cx="6171120" cy="1653120"/>
+            <a:ext cx="6171840" cy="1653840"/>
           </a:xfrm>
           <a:prstGeom prst="rect">
             <a:avLst/>
@@ -1043,7 +1043,7 @@
         <p:spPr>
           <a:xfrm>
             <a:off x="342720" y="2317680"/>
-            <a:ext cx="3011400" cy="5744520"/>
+            <a:ext cx="3011760" cy="5744880"/>
           </a:xfrm>
           <a:prstGeom prst="rect">
             <a:avLst/>
@@ -1072,8 +1072,8 @@
         </p:nvSpPr>
         <p:spPr>
           <a:xfrm>
-            <a:off x="3504960" y="2317680"/>
-            <a:ext cx="3011400" cy="5744520"/>
+            <a:off x="3505320" y="2317680"/>
+            <a:ext cx="3011760" cy="5744880"/>
           </a:xfrm>
           <a:prstGeom prst="rect">
             <a:avLst/>
@@ -1125,7 +1125,7 @@
         <p:spPr>
           <a:xfrm>
             <a:off x="342720" y="394920"/>
-            <a:ext cx="6171120" cy="1653120"/>
+            <a:ext cx="6171840" cy="1653840"/>
           </a:xfrm>
           <a:prstGeom prst="rect">
             <a:avLst/>
@@ -1176,7 +1176,7 @@
         <p:spPr>
           <a:xfrm>
             <a:off x="342720" y="394920"/>
-            <a:ext cx="6171120" cy="7664040"/>
+            <a:ext cx="6171840" cy="7667640"/>
           </a:xfrm>
           <a:prstGeom prst="rect">
             <a:avLst/>
@@ -1227,7 +1227,7 @@
         <p:spPr>
           <a:xfrm>
             <a:off x="342720" y="394920"/>
-            <a:ext cx="6171120" cy="1653120"/>
+            <a:ext cx="6171840" cy="1653840"/>
           </a:xfrm>
           <a:prstGeom prst="rect">
             <a:avLst/>
@@ -1256,7 +1256,7 @@
         <p:spPr>
           <a:xfrm>
             <a:off x="342720" y="2317680"/>
-            <a:ext cx="3011400" cy="2739960"/>
+            <a:ext cx="3011760" cy="2739960"/>
           </a:xfrm>
           <a:prstGeom prst="rect">
             <a:avLst/>
@@ -1286,7 +1286,7 @@
         <p:spPr>
           <a:xfrm>
             <a:off x="342720" y="5318280"/>
-            <a:ext cx="3011400" cy="2739960"/>
+            <a:ext cx="3011760" cy="2739960"/>
           </a:xfrm>
           <a:prstGeom prst="rect">
             <a:avLst/>
@@ -1315,8 +1315,8 @@
         </p:nvSpPr>
         <p:spPr>
           <a:xfrm>
-            <a:off x="3504960" y="2317680"/>
-            <a:ext cx="3011400" cy="5744520"/>
+            <a:off x="3505320" y="2317680"/>
+            <a:ext cx="3011760" cy="5744880"/>
           </a:xfrm>
           <a:prstGeom prst="rect">
             <a:avLst/>
@@ -1368,7 +1368,7 @@
         <p:spPr>
           <a:xfrm>
             <a:off x="342720" y="394920"/>
-            <a:ext cx="6171120" cy="1653120"/>
+            <a:ext cx="6171840" cy="1653840"/>
           </a:xfrm>
           <a:prstGeom prst="rect">
             <a:avLst/>
@@ -1397,7 +1397,7 @@
         <p:spPr>
           <a:xfrm>
             <a:off x="342720" y="2317680"/>
-            <a:ext cx="3011400" cy="5744520"/>
+            <a:ext cx="3011760" cy="5744880"/>
           </a:xfrm>
           <a:prstGeom prst="rect">
             <a:avLst/>
@@ -1426,8 +1426,8 @@
         </p:nvSpPr>
         <p:spPr>
           <a:xfrm>
-            <a:off x="3504960" y="2317680"/>
-            <a:ext cx="3011400" cy="2739960"/>
+            <a:off x="3505320" y="2317680"/>
+            <a:ext cx="3011760" cy="2739960"/>
           </a:xfrm>
           <a:prstGeom prst="rect">
             <a:avLst/>
@@ -1456,8 +1456,8 @@
         </p:nvSpPr>
         <p:spPr>
           <a:xfrm>
-            <a:off x="3504960" y="5318280"/>
-            <a:ext cx="3011400" cy="2739960"/>
+            <a:off x="3505320" y="5318280"/>
+            <a:ext cx="3011760" cy="2739960"/>
           </a:xfrm>
           <a:prstGeom prst="rect">
             <a:avLst/>
@@ -1509,7 +1509,7 @@
         <p:spPr>
           <a:xfrm>
             <a:off x="342720" y="394920"/>
-            <a:ext cx="6171120" cy="1653120"/>
+            <a:ext cx="6171840" cy="1653840"/>
           </a:xfrm>
           <a:prstGeom prst="rect">
             <a:avLst/>
@@ -1538,7 +1538,7 @@
         <p:spPr>
           <a:xfrm>
             <a:off x="342720" y="2317680"/>
-            <a:ext cx="3011400" cy="2739960"/>
+            <a:ext cx="3011760" cy="2739960"/>
           </a:xfrm>
           <a:prstGeom prst="rect">
             <a:avLst/>
@@ -1567,8 +1567,8 @@
         </p:nvSpPr>
         <p:spPr>
           <a:xfrm>
-            <a:off x="3504960" y="2317680"/>
-            <a:ext cx="3011400" cy="2739960"/>
+            <a:off x="3505320" y="2317680"/>
+            <a:ext cx="3011760" cy="2739960"/>
           </a:xfrm>
           <a:prstGeom prst="rect">
             <a:avLst/>
@@ -1598,7 +1598,7 @@
         <p:spPr>
           <a:xfrm>
             <a:off x="342720" y="5318280"/>
-            <a:ext cx="6171480" cy="2739960"/>
+            <a:ext cx="6171840" cy="2739960"/>
           </a:xfrm>
           <a:prstGeom prst="rect">
             <a:avLst/>
@@ -1657,7 +1657,7 @@
         <p:spPr>
           <a:xfrm>
             <a:off x="342720" y="394920"/>
-            <a:ext cx="6171120" cy="1653120"/>
+            <a:ext cx="6171840" cy="1653840"/>
           </a:xfrm>
           <a:prstGeom prst="rect">
             <a:avLst/>
@@ -1666,13 +1666,92 @@
         <p:txBody>
           <a:bodyPr lIns="0" rIns="0" tIns="0" bIns="0" anchor="ctr"/>
           <a:p>
-            <a:r>
-              <a:rPr b="0" lang="en-US" sz="1800" spc="-1" strike="noStrike">
+            <a:pPr algn="ctr"/>
+            <a:r>
+              <a:rPr b="0" lang="en-US" sz="4400" spc="-1" strike="noStrike">
                 <a:latin typeface="Arial"/>
               </a:rPr>
-              <a:t>Click to edit the title text format</a:t>
-            </a:r>
-            <a:endParaRPr b="0" lang="en-US" sz="1800" spc="-1" strike="noStrike">
+              <a:t>Cli</a:t>
+            </a:r>
+            <a:r>
+              <a:rPr b="0" lang="en-US" sz="4400" spc="-1" strike="noStrike">
+                <a:latin typeface="Arial"/>
+              </a:rPr>
+              <a:t>ck </a:t>
+            </a:r>
+            <a:r>
+              <a:rPr b="0" lang="en-US" sz="4400" spc="-1" strike="noStrike">
+                <a:latin typeface="Arial"/>
+              </a:rPr>
+              <a:t>to </a:t>
+            </a:r>
+            <a:r>
+              <a:rPr b="0" lang="en-US" sz="4400" spc="-1" strike="noStrike">
+                <a:latin typeface="Arial"/>
+              </a:rPr>
+              <a:t>ed</a:t>
+            </a:r>
+            <a:r>
+              <a:rPr b="0" lang="en-US" sz="4400" spc="-1" strike="noStrike">
+                <a:latin typeface="Arial"/>
+              </a:rPr>
+              <a:t>it </a:t>
+            </a:r>
+            <a:r>
+              <a:rPr b="0" lang="en-US" sz="4400" spc="-1" strike="noStrike">
+                <a:latin typeface="Arial"/>
+              </a:rPr>
+              <a:t>th</a:t>
+            </a:r>
+            <a:r>
+              <a:rPr b="0" lang="en-US" sz="4400" spc="-1" strike="noStrike">
+                <a:latin typeface="Arial"/>
+              </a:rPr>
+              <a:t>e </a:t>
+            </a:r>
+            <a:r>
+              <a:rPr b="0" lang="en-US" sz="4400" spc="-1" strike="noStrike">
+                <a:latin typeface="Arial"/>
+              </a:rPr>
+              <a:t>titl</a:t>
+            </a:r>
+            <a:r>
+              <a:rPr b="0" lang="en-US" sz="4400" spc="-1" strike="noStrike">
+                <a:latin typeface="Arial"/>
+              </a:rPr>
+              <a:t>e </a:t>
+            </a:r>
+            <a:r>
+              <a:rPr b="0" lang="en-US" sz="4400" spc="-1" strike="noStrike">
+                <a:latin typeface="Arial"/>
+              </a:rPr>
+              <a:t>te</a:t>
+            </a:r>
+            <a:r>
+              <a:rPr b="0" lang="en-US" sz="4400" spc="-1" strike="noStrike">
+                <a:latin typeface="Arial"/>
+              </a:rPr>
+              <a:t>xt </a:t>
+            </a:r>
+            <a:r>
+              <a:rPr b="0" lang="en-US" sz="4400" spc="-1" strike="noStrike">
+                <a:latin typeface="Arial"/>
+              </a:rPr>
+              <a:t>for</a:t>
+            </a:r>
+            <a:r>
+              <a:rPr b="0" lang="en-US" sz="4400" spc="-1" strike="noStrike">
+                <a:latin typeface="Arial"/>
+              </a:rPr>
+              <a:t>m</a:t>
+            </a:r>
+            <a:r>
+              <a:rPr b="0" lang="en-US" sz="4400" spc="-1" strike="noStrike">
+                <a:latin typeface="Arial"/>
+              </a:rPr>
+              <a:t>at</a:t>
+            </a:r>
+            <a:endParaRPr b="0" lang="en-US" sz="4400" spc="-1" strike="noStrike">
               <a:latin typeface="Arial"/>
             </a:endParaRPr>
           </a:p>
@@ -1691,7 +1770,7 @@
         <p:spPr>
           <a:xfrm>
             <a:off x="342720" y="2317680"/>
-            <a:ext cx="6171480" cy="5744520"/>
+            <a:ext cx="6171840" cy="5744880"/>
           </a:xfrm>
           <a:prstGeom prst="rect">
             <a:avLst/>
@@ -1714,12 +1793,12 @@
               <a:buChar char=""/>
             </a:pPr>
             <a:r>
-              <a:rPr b="0" lang="en-US" sz="1800" spc="-1" strike="noStrike">
+              <a:rPr b="0" lang="en-US" sz="3200" spc="-1" strike="noStrike">
                 <a:latin typeface="Arial"/>
               </a:rPr>
               <a:t>Click to edit the outline text format</a:t>
             </a:r>
-            <a:endParaRPr b="0" lang="en-US" sz="1800" spc="-1" strike="noStrike">
+            <a:endParaRPr b="0" lang="en-US" sz="3200" spc="-1" strike="noStrike">
               <a:latin typeface="Arial"/>
             </a:endParaRPr>
           </a:p>
@@ -1736,12 +1815,12 @@
               <a:buChar char=""/>
             </a:pPr>
             <a:r>
-              <a:rPr b="0" lang="en-US" sz="1800" spc="-1" strike="noStrike">
+              <a:rPr b="0" lang="en-US" sz="2800" spc="-1" strike="noStrike">
                 <a:latin typeface="Arial"/>
               </a:rPr>
               <a:t>Second Outline Level</a:t>
             </a:r>
-            <a:endParaRPr b="0" lang="en-US" sz="1800" spc="-1" strike="noStrike">
+            <a:endParaRPr b="0" lang="en-US" sz="2800" spc="-1" strike="noStrike">
               <a:latin typeface="Arial"/>
             </a:endParaRPr>
           </a:p>
@@ -1758,12 +1837,12 @@
               <a:buChar char=""/>
             </a:pPr>
             <a:r>
-              <a:rPr b="0" lang="en-US" sz="1800" spc="-1" strike="noStrike">
+              <a:rPr b="0" lang="en-US" sz="2400" spc="-1" strike="noStrike">
                 <a:latin typeface="Arial"/>
               </a:rPr>
               <a:t>Third Outline Level</a:t>
             </a:r>
-            <a:endParaRPr b="0" lang="en-US" sz="1800" spc="-1" strike="noStrike">
+            <a:endParaRPr b="0" lang="en-US" sz="2400" spc="-1" strike="noStrike">
               <a:latin typeface="Arial"/>
             </a:endParaRPr>
           </a:p>
@@ -1780,12 +1859,12 @@
               <a:buChar char=""/>
             </a:pPr>
             <a:r>
-              <a:rPr b="0" lang="en-US" sz="1800" spc="-1" strike="noStrike">
+              <a:rPr b="0" lang="en-US" sz="2000" spc="-1" strike="noStrike">
                 <a:latin typeface="Arial"/>
               </a:rPr>
               <a:t>Fourth Outline Level</a:t>
             </a:r>
-            <a:endParaRPr b="0" lang="en-US" sz="1800" spc="-1" strike="noStrike">
+            <a:endParaRPr b="0" lang="en-US" sz="2000" spc="-1" strike="noStrike">
               <a:latin typeface="Arial"/>
             </a:endParaRPr>
           </a:p>
@@ -1802,12 +1881,12 @@
               <a:buChar char=""/>
             </a:pPr>
             <a:r>
-              <a:rPr b="0" lang="en-US" sz="1800" spc="-1" strike="noStrike">
+              <a:rPr b="0" lang="en-US" sz="2000" spc="-1" strike="noStrike">
                 <a:latin typeface="Arial"/>
               </a:rPr>
               <a:t>Fifth Outline Level</a:t>
             </a:r>
-            <a:endParaRPr b="0" lang="en-US" sz="1800" spc="-1" strike="noStrike">
+            <a:endParaRPr b="0" lang="en-US" sz="2000" spc="-1" strike="noStrike">
               <a:latin typeface="Arial"/>
             </a:endParaRPr>
           </a:p>
@@ -1824,12 +1903,12 @@
               <a:buChar char=""/>
             </a:pPr>
             <a:r>
-              <a:rPr b="0" lang="en-US" sz="1800" spc="-1" strike="noStrike">
+              <a:rPr b="0" lang="en-US" sz="2000" spc="-1" strike="noStrike">
                 <a:latin typeface="Arial"/>
               </a:rPr>
               <a:t>Sixth Outline Level</a:t>
             </a:r>
-            <a:endParaRPr b="0" lang="en-US" sz="1800" spc="-1" strike="noStrike">
+            <a:endParaRPr b="0" lang="en-US" sz="2000" spc="-1" strike="noStrike">
               <a:latin typeface="Arial"/>
             </a:endParaRPr>
           </a:p>
@@ -1846,12 +1925,12 @@
               <a:buChar char=""/>
             </a:pPr>
             <a:r>
-              <a:rPr b="0" lang="en-US" sz="1800" spc="-1" strike="noStrike">
+              <a:rPr b="0" lang="en-US" sz="2000" spc="-1" strike="noStrike">
                 <a:latin typeface="Arial"/>
               </a:rPr>
               <a:t>Seventh Outline Level</a:t>
             </a:r>
-            <a:endParaRPr b="0" lang="en-US" sz="1800" spc="-1" strike="noStrike">
+            <a:endParaRPr b="0" lang="en-US" sz="2000" spc="-1" strike="noStrike">
               <a:latin typeface="Arial"/>
             </a:endParaRPr>
           </a:p>
@@ -1903,7 +1982,7 @@
         <p:spPr>
           <a:xfrm>
             <a:off x="114480" y="9206640"/>
-            <a:ext cx="6599880" cy="942840"/>
+            <a:ext cx="6599520" cy="942480"/>
           </a:xfrm>
           <a:prstGeom prst="rect">
             <a:avLst/>
@@ -1933,7 +2012,7 @@
         <p:spPr>
           <a:xfrm>
             <a:off x="0" y="753840"/>
-            <a:ext cx="6856920" cy="1257480"/>
+            <a:ext cx="6856560" cy="1257120"/>
           </a:xfrm>
           <a:prstGeom prst="rect">
             <a:avLst/>
@@ -2032,7 +2111,7 @@
         <p:spPr>
           <a:xfrm>
             <a:off x="3291480" y="9201240"/>
-            <a:ext cx="1845000" cy="729000"/>
+            <a:ext cx="1844640" cy="728640"/>
           </a:xfrm>
           <a:prstGeom prst="rect">
             <a:avLst/>
@@ -2079,7 +2158,7 @@
             <a:r>
               <a:rPr b="0" lang="en-US" sz="800" spc="-1" strike="noStrike" u="sng">
                 <a:solidFill>
-                  <a:srgbClr val="0000ff"/>
+                  <a:srgbClr val="ffffff"/>
                 </a:solidFill>
                 <a:uFillTx/>
                 <a:latin typeface="Cambria"/>
@@ -2163,7 +2242,7 @@
         <p:spPr>
           <a:xfrm>
             <a:off x="174600" y="1881360"/>
-            <a:ext cx="3116880" cy="240120"/>
+            <a:ext cx="3116520" cy="239760"/>
           </a:xfrm>
           <a:prstGeom prst="roundRect">
             <a:avLst>
@@ -2223,7 +2302,7 @@
         <p:spPr>
           <a:xfrm>
             <a:off x="5136480" y="56880"/>
-            <a:ext cx="1465920" cy="491040"/>
+            <a:ext cx="1465560" cy="490680"/>
           </a:xfrm>
           <a:prstGeom prst="rect">
             <a:avLst/>
@@ -2242,7 +2321,7 @@
         <p:spPr>
           <a:xfrm>
             <a:off x="114480" y="640080"/>
-            <a:ext cx="6599880" cy="9966600"/>
+            <a:ext cx="6599520" cy="9966240"/>
           </a:xfrm>
           <a:prstGeom prst="roundRect">
             <a:avLst>
@@ -2277,7 +2356,7 @@
         <p:spPr>
           <a:xfrm>
             <a:off x="991800" y="91440"/>
-            <a:ext cx="1226520" cy="411480"/>
+            <a:ext cx="1226160" cy="411120"/>
           </a:xfrm>
           <a:prstGeom prst="rect">
             <a:avLst/>
@@ -2300,7 +2379,7 @@
         <p:spPr>
           <a:xfrm>
             <a:off x="2416320" y="64080"/>
-            <a:ext cx="2533680" cy="519840"/>
+            <a:ext cx="2533320" cy="519480"/>
           </a:xfrm>
           <a:prstGeom prst="rect">
             <a:avLst/>
@@ -2323,7 +2402,7 @@
         <p:spPr>
           <a:xfrm>
             <a:off x="218880" y="36000"/>
-            <a:ext cx="581400" cy="822240"/>
+            <a:ext cx="581040" cy="821880"/>
           </a:xfrm>
           <a:prstGeom prst="rect">
             <a:avLst/>
@@ -2346,7 +2425,7 @@
         <p:spPr>
           <a:xfrm>
             <a:off x="146880" y="9252000"/>
-            <a:ext cx="3053160" cy="631440"/>
+            <a:ext cx="3052800" cy="631080"/>
           </a:xfrm>
           <a:prstGeom prst="rect">
             <a:avLst/>
@@ -2369,7 +2448,7 @@
         <p:spPr>
           <a:xfrm>
             <a:off x="150480" y="5172840"/>
-            <a:ext cx="3141000" cy="1938600"/>
+            <a:ext cx="3140640" cy="1938240"/>
           </a:xfrm>
           <a:prstGeom prst="rect">
             <a:avLst/>
@@ -2388,7 +2467,7 @@
         <p:spPr>
           <a:xfrm>
             <a:off x="3474720" y="7528320"/>
-            <a:ext cx="3183840" cy="240120"/>
+            <a:ext cx="3183480" cy="239760"/>
           </a:xfrm>
           <a:prstGeom prst="roundRect">
             <a:avLst>
@@ -2444,7 +2523,7 @@
         <p:spPr>
           <a:xfrm>
             <a:off x="91440" y="2139120"/>
-            <a:ext cx="3291480" cy="1732680"/>
+            <a:ext cx="3291120" cy="1732320"/>
           </a:xfrm>
           <a:prstGeom prst="rect">
             <a:avLst/>
@@ -2493,7 +2572,7 @@
         <p:spPr>
           <a:xfrm>
             <a:off x="3438720" y="7756200"/>
-            <a:ext cx="3291480" cy="1278720"/>
+            <a:ext cx="3291120" cy="1278360"/>
           </a:xfrm>
           <a:prstGeom prst="rect">
             <a:avLst/>
@@ -2872,7 +2951,7 @@
         <p:spPr>
           <a:xfrm>
             <a:off x="3619440" y="2194920"/>
-            <a:ext cx="2121480" cy="329040"/>
+            <a:ext cx="2121120" cy="328680"/>
           </a:xfrm>
           <a:prstGeom prst="rect">
             <a:avLst/>
@@ -2941,7 +3020,7 @@
         <p:spPr>
           <a:xfrm>
             <a:off x="3481200" y="2901600"/>
-            <a:ext cx="2351160" cy="500760"/>
+            <a:ext cx="2350800" cy="500400"/>
           </a:xfrm>
           <a:prstGeom prst="rect">
             <a:avLst/>
@@ -3030,7 +3109,7 @@
         <p:spPr>
           <a:xfrm>
             <a:off x="3517200" y="3765600"/>
-            <a:ext cx="2315160" cy="398160"/>
+            <a:ext cx="2314800" cy="397800"/>
           </a:xfrm>
           <a:prstGeom prst="rect">
             <a:avLst/>
@@ -3099,7 +3178,7 @@
         <p:spPr>
           <a:xfrm>
             <a:off x="3606480" y="2197800"/>
-            <a:ext cx="2134440" cy="362160"/>
+            <a:ext cx="2134080" cy="361800"/>
           </a:xfrm>
           <a:prstGeom prst="roundRect">
             <a:avLst>
@@ -3130,7 +3209,7 @@
         <p:spPr>
           <a:xfrm>
             <a:off x="3606840" y="2881800"/>
-            <a:ext cx="2134080" cy="520560"/>
+            <a:ext cx="2133720" cy="520200"/>
           </a:xfrm>
           <a:prstGeom prst="roundRect">
             <a:avLst>
@@ -3165,7 +3244,7 @@
         <p:spPr>
           <a:xfrm>
             <a:off x="6054480" y="2198520"/>
-            <a:ext cx="401400" cy="406080"/>
+            <a:ext cx="401040" cy="405720"/>
           </a:xfrm>
           <a:prstGeom prst="rect">
             <a:avLst/>
@@ -3184,7 +3263,7 @@
         <p:spPr>
           <a:xfrm>
             <a:off x="3606840" y="3745800"/>
-            <a:ext cx="2134080" cy="417960"/>
+            <a:ext cx="2133720" cy="417600"/>
           </a:xfrm>
           <a:prstGeom prst="roundRect">
             <a:avLst>
@@ -3219,7 +3298,7 @@
         <p:spPr>
           <a:xfrm>
             <a:off x="6057720" y="2978280"/>
-            <a:ext cx="388800" cy="385200"/>
+            <a:ext cx="388440" cy="384840"/>
           </a:xfrm>
           <a:prstGeom prst="rect">
             <a:avLst/>
@@ -3238,7 +3317,7 @@
         <p:spPr>
           <a:xfrm>
             <a:off x="174960" y="4113720"/>
-            <a:ext cx="3116520" cy="240120"/>
+            <a:ext cx="3116160" cy="239760"/>
           </a:xfrm>
           <a:prstGeom prst="roundRect">
             <a:avLst>
@@ -3294,7 +3373,7 @@
         <p:spPr>
           <a:xfrm>
             <a:off x="91440" y="6432120"/>
-            <a:ext cx="3382560" cy="1732680"/>
+            <a:ext cx="3382200" cy="1732320"/>
           </a:xfrm>
           <a:prstGeom prst="rect">
             <a:avLst/>
@@ -3320,7 +3399,7 @@
         <p:spPr>
           <a:xfrm>
             <a:off x="3403440" y="5928120"/>
-            <a:ext cx="3291480" cy="1409040"/>
+            <a:ext cx="3291120" cy="1408680"/>
           </a:xfrm>
           <a:prstGeom prst="rect">
             <a:avLst/>
@@ -3369,7 +3448,7 @@
         <p:spPr>
           <a:xfrm>
             <a:off x="91440" y="7140600"/>
-            <a:ext cx="3291480" cy="1514880"/>
+            <a:ext cx="3291120" cy="1514520"/>
           </a:xfrm>
           <a:prstGeom prst="rect">
             <a:avLst/>
@@ -3388,7 +3467,7 @@
         <p:txBody>
           <a:bodyPr lIns="90000" rIns="90000" tIns="45000" bIns="45000"/>
           <a:p>
-            <a:pPr algn="just">
+            <a:pPr>
               <a:lnSpc>
                 <a:spcPct val="100000"/>
               </a:lnSpc>
@@ -3418,7 +3497,7 @@
             </a:endParaRPr>
           </a:p>
           <a:p>
-            <a:pPr algn="just">
+            <a:pPr>
               <a:lnSpc>
                 <a:spcPct val="100000"/>
               </a:lnSpc>
@@ -3428,7 +3507,7 @@
             </a:endParaRPr>
           </a:p>
           <a:p>
-            <a:pPr algn="just">
+            <a:pPr>
               <a:lnSpc>
                 <a:spcPct val="100000"/>
               </a:lnSpc>
@@ -3448,7 +3527,7 @@
             </a:endParaRPr>
           </a:p>
           <a:p>
-            <a:pPr algn="just">
+            <a:pPr>
               <a:lnSpc>
                 <a:spcPct val="100000"/>
               </a:lnSpc>
@@ -3458,7 +3537,7 @@
             </a:endParaRPr>
           </a:p>
           <a:p>
-            <a:pPr marL="216000" indent="-215640" algn="just">
+            <a:pPr marL="216000" indent="-215280">
               <a:lnSpc>
                 <a:spcPct val="100000"/>
               </a:lnSpc>
@@ -3482,14 +3561,14 @@
                 <a:latin typeface="Cambria"/>
                 <a:ea typeface="ＭＳ Ｐゴシック"/>
               </a:rPr>
-              <a:t>Best practice approaches are shared among the scientific community through the Galaxy platform as reusable workflows.</a:t>
+              <a:t>Best practice approaches are shared among the scientific community through the Galaxy platform as reusable workflows</a:t>
             </a:r>
             <a:endParaRPr b="0" lang="en-US" sz="800" spc="-1" strike="noStrike">
               <a:latin typeface="Arial"/>
             </a:endParaRPr>
           </a:p>
           <a:p>
-            <a:pPr marL="216000" indent="-215640" algn="just">
+            <a:pPr marL="216000" indent="-215280">
               <a:lnSpc>
                 <a:spcPct val="100000"/>
               </a:lnSpc>
@@ -3513,7 +3592,7 @@
                 <a:latin typeface="Cambria"/>
                 <a:ea typeface="ＭＳ Ｐゴシック"/>
               </a:rPr>
-              <a:t>Tool pertinence is inferred from the provided EDAM ontology terms, associated to its operations and input/output data formats.</a:t>
+              <a:t>Tool pertinence is inferred from the provided EDAM ontology terms, associated to its operations and input/output data formats</a:t>
             </a:r>
             <a:endParaRPr b="0" lang="en-US" sz="800" spc="-1" strike="noStrike">
               <a:latin typeface="Arial"/>
@@ -3530,7 +3609,7 @@
         <p:spPr>
           <a:xfrm>
             <a:off x="91440" y="4368600"/>
-            <a:ext cx="3291480" cy="751680"/>
+            <a:ext cx="3291120" cy="751320"/>
           </a:xfrm>
           <a:prstGeom prst="rect">
             <a:avLst/>
@@ -3549,7 +3628,7 @@
         <p:txBody>
           <a:bodyPr lIns="90000" rIns="90000" tIns="45000" bIns="45000"/>
           <a:p>
-            <a:pPr marL="216000" indent="-215640" algn="just">
+            <a:pPr marL="216000" indent="-215280" algn="just">
               <a:lnSpc>
                 <a:spcPct val="100000"/>
               </a:lnSpc>
@@ -3580,7 +3659,7 @@
             </a:endParaRPr>
           </a:p>
           <a:p>
-            <a:pPr marL="216000" indent="-215640" algn="just">
+            <a:pPr marL="216000" indent="-215280" algn="just">
               <a:lnSpc>
                 <a:spcPct val="100000"/>
               </a:lnSpc>
@@ -3611,7 +3690,7 @@
             </a:endParaRPr>
           </a:p>
           <a:p>
-            <a:pPr marL="216000" indent="-215640" algn="just">
+            <a:pPr marL="216000" indent="-215280" algn="just">
               <a:lnSpc>
                 <a:spcPct val="100000"/>
               </a:lnSpc>
@@ -3642,7 +3721,7 @@
             </a:endParaRPr>
           </a:p>
           <a:p>
-            <a:pPr marL="216000" indent="-215640" algn="just">
+            <a:pPr marL="216000" indent="-215280" algn="just">
               <a:lnSpc>
                 <a:spcPct val="100000"/>
               </a:lnSpc>
@@ -3683,7 +3762,7 @@
         <p:spPr>
           <a:xfrm>
             <a:off x="3522600" y="1881720"/>
-            <a:ext cx="3116880" cy="240120"/>
+            <a:ext cx="3116520" cy="239760"/>
           </a:xfrm>
           <a:prstGeom prst="roundRect">
             <a:avLst>
@@ -3743,7 +3822,7 @@
         <p:spPr>
           <a:xfrm>
             <a:off x="6015240" y="3736440"/>
-            <a:ext cx="486720" cy="688320"/>
+            <a:ext cx="486360" cy="687960"/>
           </a:xfrm>
           <a:prstGeom prst="rect">
             <a:avLst/>
@@ -3762,7 +3841,7 @@
         <p:spPr>
           <a:xfrm>
             <a:off x="4673880" y="2560320"/>
-            <a:ext cx="360" cy="321480"/>
+            <a:ext cx="360" cy="321120"/>
           </a:xfrm>
           <a:custGeom>
             <a:avLst/>
@@ -3805,7 +3884,7 @@
         <p:spPr>
           <a:xfrm>
             <a:off x="4673880" y="3402720"/>
-            <a:ext cx="360" cy="343080"/>
+            <a:ext cx="360" cy="342720"/>
           </a:xfrm>
           <a:custGeom>
             <a:avLst/>
@@ -3852,7 +3931,7 @@
         <p:spPr>
           <a:xfrm>
             <a:off x="4093200" y="4461120"/>
-            <a:ext cx="2067840" cy="2834280"/>
+            <a:ext cx="2067480" cy="2833920"/>
           </a:xfrm>
           <a:prstGeom prst="rect">
             <a:avLst/>
@@ -3871,7 +3950,7 @@
         <p:spPr>
           <a:xfrm>
             <a:off x="5518080" y="5724000"/>
-            <a:ext cx="914040" cy="207360"/>
+            <a:ext cx="913680" cy="207000"/>
           </a:xfrm>
           <a:prstGeom prst="rect">
             <a:avLst/>
@@ -3896,6 +3975,7 @@
                   <a:srgbClr val="2f5597"/>
                 </a:solidFill>
                 <a:latin typeface="Cambria"/>
+                <a:ea typeface="DejaVu Sans"/>
               </a:rPr>
               <a:t>Training events</a:t>
             </a:r>
@@ -3914,7 +3994,7 @@
         <p:spPr>
           <a:xfrm>
             <a:off x="3605040" y="5652720"/>
-            <a:ext cx="1426680" cy="559440"/>
+            <a:ext cx="1426320" cy="559080"/>
           </a:xfrm>
           <a:prstGeom prst="rect">
             <a:avLst/>
@@ -3939,6 +4019,7 @@
                   <a:srgbClr val="ff1493"/>
                 </a:solidFill>
                 <a:latin typeface="Cambria"/>
+                <a:ea typeface="DejaVu Sans"/>
               </a:rPr>
               <a:t>Galaxy Interactive</a:t>
             </a:r>
@@ -3953,6 +4034,7 @@
                   <a:srgbClr val="ff1493"/>
                 </a:solidFill>
                 <a:latin typeface="Cambria"/>
+                <a:ea typeface="DejaVu Sans"/>
               </a:rPr>
               <a:t>Recommendation system</a:t>
             </a:r>
@@ -3970,8 +4052,8 @@
         </p:nvSpPr>
         <p:spPr>
           <a:xfrm>
-            <a:off x="4829040" y="4572720"/>
-            <a:ext cx="914040" cy="207360"/>
+            <a:off x="4865040" y="4536720"/>
+            <a:ext cx="913680" cy="207000"/>
           </a:xfrm>
           <a:prstGeom prst="rect">
             <a:avLst/>
@@ -3996,6 +4078,7 @@
                   <a:srgbClr val="ff1493"/>
                 </a:solidFill>
                 <a:latin typeface="Cambria"/>
+                <a:ea typeface="DejaVu Sans"/>
               </a:rPr>
               <a:t>Galaxy Tours</a:t>
             </a:r>
@@ -4014,7 +4097,7 @@
         <p:spPr>
           <a:xfrm>
             <a:off x="3713040" y="5904360"/>
-            <a:ext cx="914040" cy="207360"/>
+            <a:ext cx="913680" cy="207000"/>
           </a:xfrm>
           <a:prstGeom prst="rect">
             <a:avLst/>
@@ -4039,6 +4122,7 @@
                   <a:srgbClr val="000000"/>
                 </a:solidFill>
                 <a:latin typeface="Cambria"/>
+                <a:ea typeface="DejaVu Sans"/>
               </a:rPr>
               <a:t>Hackathon</a:t>
             </a:r>
@@ -4056,8 +4140,8 @@
         </p:nvSpPr>
         <p:spPr>
           <a:xfrm>
-            <a:off x="4937040" y="4464360"/>
-            <a:ext cx="914040" cy="207360"/>
+            <a:off x="4937040" y="4428360"/>
+            <a:ext cx="913680" cy="207000"/>
           </a:xfrm>
           <a:prstGeom prst="rect">
             <a:avLst/>
@@ -4082,6 +4166,7 @@
                   <a:srgbClr val="2f5597"/>
                 </a:solidFill>
                 <a:latin typeface="Cambria"/>
+                <a:ea typeface="DejaVu Sans"/>
               </a:rPr>
               <a:t>Training events</a:t>
             </a:r>
@@ -4099,8 +4184,8 @@
         </p:nvSpPr>
         <p:spPr>
           <a:xfrm>
-            <a:off x="5621040" y="5869080"/>
-            <a:ext cx="914040" cy="207360"/>
+            <a:off x="5585040" y="5833080"/>
+            <a:ext cx="913680" cy="207000"/>
           </a:xfrm>
           <a:prstGeom prst="rect">
             <a:avLst/>
@@ -4125,6 +4210,7 @@
                   <a:srgbClr val="ff1493"/>
                 </a:solidFill>
                 <a:latin typeface="Cambria"/>
+                <a:ea typeface="DejaVu Sans"/>
               </a:rPr>
               <a:t>Galaxy Flavor</a:t>
             </a:r>
@@ -4143,7 +4229,7 @@
         <p:spPr>
           <a:xfrm>
             <a:off x="3713040" y="7021080"/>
-            <a:ext cx="914040" cy="207360"/>
+            <a:ext cx="913680" cy="207000"/>
           </a:xfrm>
           <a:prstGeom prst="rect">
             <a:avLst/>
@@ -4168,6 +4254,7 @@
                   <a:srgbClr val="ff1493"/>
                 </a:solidFill>
                 <a:latin typeface="Cambria"/>
+                <a:ea typeface="DejaVu Sans"/>
               </a:rPr>
               <a:t>Galaxy Tours</a:t>
             </a:r>
@@ -4185,8 +4272,8 @@
         </p:nvSpPr>
         <p:spPr>
           <a:xfrm>
-            <a:off x="3641040" y="6876720"/>
-            <a:ext cx="914040" cy="207360"/>
+            <a:off x="3641040" y="6912720"/>
+            <a:ext cx="913680" cy="207000"/>
           </a:xfrm>
           <a:prstGeom prst="rect">
             <a:avLst/>
@@ -4211,6 +4298,7 @@
                   <a:srgbClr val="000000"/>
                 </a:solidFill>
                 <a:latin typeface="Cambria"/>
+                <a:ea typeface="DejaVu Sans"/>
               </a:rPr>
               <a:t>Hackathon</a:t>
             </a:r>
@@ -4228,8 +4316,8 @@
         </p:nvSpPr>
         <p:spPr>
           <a:xfrm>
-            <a:off x="3821040" y="7164360"/>
-            <a:ext cx="914040" cy="207360"/>
+            <a:off x="3821040" y="7128360"/>
+            <a:ext cx="913680" cy="207000"/>
           </a:xfrm>
           <a:prstGeom prst="rect">
             <a:avLst/>
@@ -4254,6 +4342,7 @@
                   <a:srgbClr val="2f5597"/>
                 </a:solidFill>
                 <a:latin typeface="Cambria"/>
+                <a:ea typeface="DejaVu Sans"/>
               </a:rPr>
               <a:t>Training events</a:t>
             </a:r>
@@ -4356,7 +4445,7 @@
         <p:spPr>
           <a:xfrm>
             <a:off x="3873600" y="4389120"/>
-            <a:ext cx="848160" cy="207360"/>
+            <a:ext cx="847800" cy="207000"/>
           </a:xfrm>
           <a:prstGeom prst="rect">
             <a:avLst/>
@@ -4377,7 +4466,11 @@
           <a:p>
             <a:r>
               <a:rPr b="1" lang="en-US" sz="800" spc="-1" strike="noStrike">
-                <a:latin typeface="Cambria"/>
+                <a:solidFill>
+                  <a:srgbClr val="000000"/>
+                </a:solidFill>
+                <a:latin typeface="Cambria"/>
+                <a:ea typeface="DejaVu Sans"/>
               </a:rPr>
               <a:t>destairdenbi</a:t>
             </a:r>
@@ -4400,7 +4493,7 @@
         <p:spPr>
           <a:xfrm>
             <a:off x="3644640" y="4349520"/>
-            <a:ext cx="274680" cy="274680"/>
+            <a:ext cx="274320" cy="274320"/>
           </a:xfrm>
           <a:prstGeom prst="rect">
             <a:avLst/>
@@ -4419,7 +4512,7 @@
         <p:spPr>
           <a:xfrm>
             <a:off x="5832720" y="2563200"/>
-            <a:ext cx="822600" cy="182520"/>
+            <a:ext cx="822240" cy="182160"/>
           </a:xfrm>
           <a:prstGeom prst="rect">
             <a:avLst/>
@@ -4449,6 +4542,7 @@
                   <a:srgbClr val="00bfff"/>
                 </a:solidFill>
                 <a:latin typeface="Cambria"/>
+                <a:ea typeface="DejaVu Sans"/>
               </a:rPr>
               <a:t>galaxyproject.org</a:t>
             </a:r>
@@ -4467,7 +4561,7 @@
         <p:spPr>
           <a:xfrm>
             <a:off x="5832720" y="3355200"/>
-            <a:ext cx="822600" cy="182520"/>
+            <a:ext cx="822240" cy="182160"/>
           </a:xfrm>
           <a:prstGeom prst="rect">
             <a:avLst/>
@@ -4497,6 +4591,7 @@
                   <a:srgbClr val="00bfff"/>
                 </a:solidFill>
                 <a:latin typeface="Cambria"/>
+                <a:ea typeface="DejaVu Sans"/>
               </a:rPr>
               <a:t>edamontology.org</a:t>
             </a:r>
@@ -4515,7 +4610,7 @@
         <p:spPr>
           <a:xfrm>
             <a:off x="5832720" y="4147200"/>
-            <a:ext cx="822600" cy="182520"/>
+            <a:ext cx="822240" cy="182160"/>
           </a:xfrm>
           <a:prstGeom prst="rect">
             <a:avLst/>
@@ -4545,6 +4640,7 @@
                   <a:srgbClr val="00bfff"/>
                 </a:solidFill>
                 <a:latin typeface="Cambria"/>
+                <a:ea typeface="DejaVu Sans"/>
               </a:rPr>
               <a:t>denbi.de/rbc</a:t>
             </a:r>
@@ -4567,7 +4663,7 @@
         <p:spPr>
           <a:xfrm>
             <a:off x="5419440" y="9363600"/>
-            <a:ext cx="582120" cy="403560"/>
+            <a:ext cx="581760" cy="403200"/>
           </a:xfrm>
           <a:prstGeom prst="rect">
             <a:avLst/>
@@ -4590,7 +4686,7 @@
         <p:spPr>
           <a:xfrm>
             <a:off x="6070680" y="9358200"/>
-            <a:ext cx="624960" cy="416520"/>
+            <a:ext cx="624600" cy="416160"/>
           </a:xfrm>
           <a:prstGeom prst="rect">
             <a:avLst/>
@@ -4613,7 +4709,7 @@
         <p:spPr>
           <a:xfrm>
             <a:off x="5869080" y="7040880"/>
-            <a:ext cx="694800" cy="182520"/>
+            <a:ext cx="694440" cy="182160"/>
           </a:xfrm>
           <a:prstGeom prst="rect">
             <a:avLst/>
@@ -4632,7 +4728,7 @@
         <p:spPr>
           <a:xfrm>
             <a:off x="5832720" y="7207200"/>
-            <a:ext cx="822600" cy="182520"/>
+            <a:ext cx="822240" cy="182160"/>
           </a:xfrm>
           <a:prstGeom prst="rect">
             <a:avLst/>
@@ -4662,11 +4758,12 @@
                   <a:srgbClr val="00bfff"/>
                 </a:solidFill>
                 <a:latin typeface="Cambria"/>
+                <a:ea typeface="DejaVu Sans"/>
               </a:rPr>
               <a:t>denbi.de</a:t>
             </a:r>
             <a:endParaRPr b="0" lang="en-US" sz="600" spc="-1" strike="noStrike">
-              <a:latin typeface="Arial"/>
+              <a:latin typeface="Cambria"/>
             </a:endParaRPr>
           </a:p>
         </p:txBody>
@@ -4680,7 +4777,7 @@
         <p:spPr>
           <a:xfrm>
             <a:off x="3600720" y="4615200"/>
-            <a:ext cx="1081800" cy="267120"/>
+            <a:ext cx="1081440" cy="266760"/>
           </a:xfrm>
           <a:prstGeom prst="rect">
             <a:avLst/>
@@ -4710,11 +4807,12 @@
                   <a:srgbClr val="00bfff"/>
                 </a:solidFill>
                 <a:latin typeface="Cambria"/>
+                <a:ea typeface="DejaVu Sans"/>
               </a:rPr>
               <a:t>destair.bioinf.uni-leipzig.de</a:t>
             </a:r>
             <a:endParaRPr b="0" lang="en-US" sz="600" spc="-1" strike="noStrike">
-              <a:latin typeface="Arial"/>
+              <a:latin typeface="Cambria"/>
             </a:endParaRPr>
           </a:p>
         </p:txBody>

</xml_diff>